<commit_message>
mostly help page cleaning
</commit_message>
<xml_diff>
--- a/docs/mkSEERfig.pptx
+++ b/docs/mkSEERfig.pptx
@@ -289,7 +289,7 @@
             <a:fld id="{1D8BD707-D9CF-40AE-B4C6-C98DA3205C09}" type="datetimeFigureOut">
               <a:rPr lang="en-US" smtClean="0"/>
               <a:pPr/>
-              <a:t>1/14/15</a:t>
+              <a:t>5/2/15</a:t>
             </a:fld>
             <a:endParaRPr lang="en-US"/>
           </a:p>
@@ -456,7 +456,7 @@
             <a:fld id="{1D8BD707-D9CF-40AE-B4C6-C98DA3205C09}" type="datetimeFigureOut">
               <a:rPr lang="en-US" smtClean="0"/>
               <a:pPr/>
-              <a:t>1/14/15</a:t>
+              <a:t>5/2/15</a:t>
             </a:fld>
             <a:endParaRPr lang="en-US"/>
           </a:p>
@@ -633,7 +633,7 @@
             <a:fld id="{1D8BD707-D9CF-40AE-B4C6-C98DA3205C09}" type="datetimeFigureOut">
               <a:rPr lang="en-US" smtClean="0"/>
               <a:pPr/>
-              <a:t>1/14/15</a:t>
+              <a:t>5/2/15</a:t>
             </a:fld>
             <a:endParaRPr lang="en-US"/>
           </a:p>
@@ -800,7 +800,7 @@
             <a:fld id="{1D8BD707-D9CF-40AE-B4C6-C98DA3205C09}" type="datetimeFigureOut">
               <a:rPr lang="en-US" smtClean="0"/>
               <a:pPr/>
-              <a:t>1/14/15</a:t>
+              <a:t>5/2/15</a:t>
             </a:fld>
             <a:endParaRPr lang="en-US"/>
           </a:p>
@@ -1043,7 +1043,7 @@
             <a:fld id="{1D8BD707-D9CF-40AE-B4C6-C98DA3205C09}" type="datetimeFigureOut">
               <a:rPr lang="en-US" smtClean="0"/>
               <a:pPr/>
-              <a:t>1/14/15</a:t>
+              <a:t>5/2/15</a:t>
             </a:fld>
             <a:endParaRPr lang="en-US"/>
           </a:p>
@@ -1328,7 +1328,7 @@
             <a:fld id="{1D8BD707-D9CF-40AE-B4C6-C98DA3205C09}" type="datetimeFigureOut">
               <a:rPr lang="en-US" smtClean="0"/>
               <a:pPr/>
-              <a:t>1/14/15</a:t>
+              <a:t>5/2/15</a:t>
             </a:fld>
             <a:endParaRPr lang="en-US"/>
           </a:p>
@@ -1747,7 +1747,7 @@
             <a:fld id="{1D8BD707-D9CF-40AE-B4C6-C98DA3205C09}" type="datetimeFigureOut">
               <a:rPr lang="en-US" smtClean="0"/>
               <a:pPr/>
-              <a:t>1/14/15</a:t>
+              <a:t>5/2/15</a:t>
             </a:fld>
             <a:endParaRPr lang="en-US"/>
           </a:p>
@@ -1862,7 +1862,7 @@
             <a:fld id="{1D8BD707-D9CF-40AE-B4C6-C98DA3205C09}" type="datetimeFigureOut">
               <a:rPr lang="en-US" smtClean="0"/>
               <a:pPr/>
-              <a:t>1/14/15</a:t>
+              <a:t>5/2/15</a:t>
             </a:fld>
             <a:endParaRPr lang="en-US"/>
           </a:p>
@@ -1954,7 +1954,7 @@
             <a:fld id="{1D8BD707-D9CF-40AE-B4C6-C98DA3205C09}" type="datetimeFigureOut">
               <a:rPr lang="en-US" smtClean="0"/>
               <a:pPr/>
-              <a:t>1/14/15</a:t>
+              <a:t>5/2/15</a:t>
             </a:fld>
             <a:endParaRPr lang="en-US"/>
           </a:p>
@@ -2228,7 +2228,7 @@
             <a:fld id="{1D8BD707-D9CF-40AE-B4C6-C98DA3205C09}" type="datetimeFigureOut">
               <a:rPr lang="en-US" smtClean="0"/>
               <a:pPr/>
-              <a:t>1/14/15</a:t>
+              <a:t>5/2/15</a:t>
             </a:fld>
             <a:endParaRPr lang="en-US"/>
           </a:p>
@@ -2478,7 +2478,7 @@
             <a:fld id="{1D8BD707-D9CF-40AE-B4C6-C98DA3205C09}" type="datetimeFigureOut">
               <a:rPr lang="en-US" smtClean="0"/>
               <a:pPr/>
-              <a:t>1/14/15</a:t>
+              <a:t>5/2/15</a:t>
             </a:fld>
             <a:endParaRPr lang="en-US"/>
           </a:p>
@@ -2688,7 +2688,7 @@
             <a:fld id="{1D8BD707-D9CF-40AE-B4C6-C98DA3205C09}" type="datetimeFigureOut">
               <a:rPr lang="en-US" smtClean="0"/>
               <a:pPr/>
-              <a:t>1/14/15</a:t>
+              <a:t>5/2/15</a:t>
             </a:fld>
             <a:endParaRPr lang="en-US"/>
           </a:p>
@@ -3092,75 +3092,27 @@
                   <a:srgbClr val="000000"/>
                 </a:solidFill>
               </a:rPr>
-              <a:t>incidence/</a:t>
-            </a:r>
+              <a:t>incidence/yr1973_X.seer9/CANCER.TXT</a:t>
+            </a:r>
+          </a:p>
+          <a:p>
             <a:r>
               <a:rPr lang="en-US" sz="1400" dirty="0" smtClean="0">
                 <a:solidFill>
                   <a:srgbClr val="000000"/>
                 </a:solidFill>
               </a:rPr>
-              <a:t>yr1973_X.seer9</a:t>
-            </a:r>
+              <a:t>incidence/yr1992_X.sj_la_rg_ak/CANCER.TXT</a:t>
+            </a:r>
+          </a:p>
+          <a:p>
             <a:r>
               <a:rPr lang="en-US" sz="1400" dirty="0" smtClean="0">
                 <a:solidFill>
                   <a:srgbClr val="000000"/>
                 </a:solidFill>
               </a:rPr>
-              <a:t>/CANCER.TXT</a:t>
-            </a:r>
-          </a:p>
-          <a:p>
-            <a:r>
-              <a:rPr lang="en-US" sz="1400" dirty="0" smtClean="0">
-                <a:solidFill>
-                  <a:srgbClr val="000000"/>
-                </a:solidFill>
-              </a:rPr>
-              <a:t>incidence/</a:t>
-            </a:r>
-            <a:r>
-              <a:rPr lang="en-US" sz="1400" dirty="0" smtClean="0">
-                <a:solidFill>
-                  <a:srgbClr val="000000"/>
-                </a:solidFill>
-              </a:rPr>
-              <a:t>yr1992_X.sj_la_rg_ak</a:t>
-            </a:r>
-            <a:r>
-              <a:rPr lang="en-US" sz="1400" dirty="0" smtClean="0">
-                <a:solidFill>
-                  <a:srgbClr val="000000"/>
-                </a:solidFill>
-              </a:rPr>
-              <a:t>/CANCER.TXT</a:t>
-            </a:r>
-          </a:p>
-          <a:p>
-            <a:r>
-              <a:rPr lang="en-US" sz="1400" dirty="0" smtClean="0">
-                <a:solidFill>
-                  <a:srgbClr val="000000"/>
-                </a:solidFill>
-              </a:rPr>
-              <a:t>incidence/</a:t>
-            </a:r>
-            <a:r>
-              <a:rPr lang="en-US" sz="1400" dirty="0" smtClean="0">
-                <a:solidFill>
-                  <a:srgbClr val="000000"/>
-                </a:solidFill>
-              </a:rPr>
-              <a:t>yr2000_X.ca_ky_lo_nj_ga</a:t>
-            </a:r>
-            <a:r>
-              <a:rPr lang="en-US" sz="1400" dirty="0" smtClean="0">
-                <a:solidFill>
-                  <a:srgbClr val="000000"/>
-                </a:solidFill>
-              </a:rPr>
-              <a:t>/CANCER.TXT</a:t>
+              <a:t>incidence/yr2000_X.ca_ky_lo_nj_ga/CANCER.TXT</a:t>
             </a:r>
             <a:endParaRPr lang="en-US" sz="1400" dirty="0">
               <a:solidFill>
@@ -3179,7 +3131,7 @@
         <p:spPr>
           <a:xfrm>
             <a:off x="922839" y="1502816"/>
-            <a:ext cx="1874131" cy="2677656"/>
+            <a:ext cx="1964513" cy="2893100"/>
           </a:xfrm>
           <a:prstGeom prst="rect">
             <a:avLst/>
@@ -3380,12 +3332,51 @@
               <a:t>/</a:t>
             </a:r>
             <a:r>
-              <a:rPr lang="en-US" sz="1400" b="1" dirty="0" err="1" smtClean="0">
+              <a:rPr lang="en-US" sz="1400" dirty="0" err="1" smtClean="0">
                 <a:solidFill>
                   <a:srgbClr val="000000"/>
                 </a:solidFill>
               </a:rPr>
               <a:t>popsa.RData</a:t>
+            </a:r>
+            <a:endParaRPr lang="en-US" sz="1400" dirty="0">
+              <a:solidFill>
+                <a:srgbClr val="000000"/>
+              </a:solidFill>
+            </a:endParaRPr>
+          </a:p>
+          <a:p>
+            <a:r>
+              <a:rPr lang="en-US" sz="1400" dirty="0" smtClean="0">
+                <a:solidFill>
+                  <a:srgbClr val="000000"/>
+                </a:solidFill>
+              </a:rPr>
+              <a:t>       </a:t>
+            </a:r>
+            <a:r>
+              <a:rPr lang="en-US" sz="1400" dirty="0" err="1" smtClean="0">
+                <a:solidFill>
+                  <a:srgbClr val="000000"/>
+                </a:solidFill>
+              </a:rPr>
+              <a:t>mrgd</a:t>
+            </a:r>
+            <a:r>
+              <a:rPr lang="en-US" sz="1400" dirty="0">
+                <a:solidFill>
+                  <a:srgbClr val="000000"/>
+                </a:solidFill>
+              </a:rPr>
+              <a:t>/</a:t>
+            </a:r>
+            <a:r>
+              <a:rPr lang="en-US" sz="1400" b="1" dirty="0" err="1" smtClean="0">
+                <a:solidFill>
+                  <a:srgbClr val="000000"/>
+                </a:solidFill>
+              </a:rPr>
+              <a:t>popsae.RData</a:t>
             </a:r>
             <a:endParaRPr lang="en-US" sz="1400" b="1" dirty="0">
               <a:solidFill>
@@ -3754,15 +3745,7 @@
                   <a:srgbClr val="000000"/>
                 </a:solidFill>
               </a:rPr>
-              <a:t>(  </a:t>
-            </a:r>
-            <a:r>
-              <a:rPr lang="en-US" dirty="0" smtClean="0">
-                <a:solidFill>
-                  <a:srgbClr val="000000"/>
-                </a:solidFill>
-              </a:rPr>
-              <a:t>)</a:t>
+              <a:t>(  )</a:t>
             </a:r>
             <a:endParaRPr lang="en-US" dirty="0">
               <a:solidFill>
@@ -3816,7 +3799,7 @@
         </p:nvSpPr>
         <p:spPr>
           <a:xfrm>
-            <a:off x="25402" y="4068641"/>
+            <a:off x="25402" y="4106741"/>
             <a:ext cx="6737567" cy="738664"/>
           </a:xfrm>
           <a:prstGeom prst="rect">
@@ -3857,23 +3840,7 @@
                   <a:srgbClr val="000000"/>
                 </a:solidFill>
               </a:rPr>
-              <a:t>/</a:t>
-            </a:r>
-            <a:r>
-              <a:rPr lang="en-US" sz="1400" dirty="0" smtClean="0">
-                <a:solidFill>
-                  <a:srgbClr val="000000"/>
-                </a:solidFill>
-              </a:rPr>
-              <a:t>yr1973_X.seer9</a:t>
-            </a:r>
-            <a:r>
-              <a:rPr lang="en-US" sz="1400" dirty="0" smtClean="0">
-                <a:solidFill>
-                  <a:srgbClr val="000000"/>
-                </a:solidFill>
-              </a:rPr>
-              <a:t>/19agegroups.txt</a:t>
+              <a:t>/yr1973_X.seer9/19agegroups.txt</a:t>
             </a:r>
             <a:endParaRPr lang="en-US" sz="1400" dirty="0">
               <a:solidFill>
@@ -3904,23 +3871,7 @@
                   <a:srgbClr val="000000"/>
                 </a:solidFill>
               </a:rPr>
-              <a:t>/</a:t>
-            </a:r>
-            <a:r>
-              <a:rPr lang="en-US" sz="1400" dirty="0" smtClean="0">
-                <a:solidFill>
-                  <a:srgbClr val="000000"/>
-                </a:solidFill>
-              </a:rPr>
-              <a:t>yr1992_X.seer9</a:t>
-            </a:r>
-            <a:r>
-              <a:rPr lang="en-US" sz="1400" dirty="0" smtClean="0">
-                <a:solidFill>
-                  <a:srgbClr val="000000"/>
-                </a:solidFill>
-              </a:rPr>
-              <a:t>.plus.sj_la_rg_ak/19agegroups.txt</a:t>
+              <a:t>/yr1992_X.seer9.plus.sj_la_rg_ak/19agegroups.txt</a:t>
             </a:r>
           </a:p>
           <a:p>
@@ -3946,23 +3897,7 @@
                   <a:srgbClr val="000000"/>
                 </a:solidFill>
               </a:rPr>
-              <a:t>/</a:t>
-            </a:r>
-            <a:r>
-              <a:rPr lang="en-US" sz="1400" dirty="0" smtClean="0">
-                <a:solidFill>
-                  <a:srgbClr val="000000"/>
-                </a:solidFill>
-              </a:rPr>
-              <a:t>yr2000_X.ca_ky_lo_nj_ga</a:t>
-            </a:r>
-            <a:r>
-              <a:rPr lang="en-US" sz="1400" dirty="0" smtClean="0">
-                <a:solidFill>
-                  <a:srgbClr val="000000"/>
-                </a:solidFill>
-              </a:rPr>
-              <a:t>/19agegroups.txt</a:t>
+              <a:t>/yr2000_X.ca_ky_lo_nj_ga/19agegroups.txt</a:t>
             </a:r>
             <a:endParaRPr lang="en-US" sz="1400" dirty="0">
               <a:solidFill>
@@ -5862,23 +5797,7 @@
                   <a:srgbClr val="000000"/>
                 </a:solidFill>
               </a:rPr>
-              <a:t>/</a:t>
-            </a:r>
-            <a:r>
-              <a:rPr lang="en-US" sz="1400" dirty="0" smtClean="0">
-                <a:solidFill>
-                  <a:srgbClr val="000000"/>
-                </a:solidFill>
-              </a:rPr>
-              <a:t>yr1973_X.seer9</a:t>
-            </a:r>
-            <a:r>
-              <a:rPr lang="en-US" sz="1400" dirty="0" smtClean="0">
-                <a:solidFill>
-                  <a:srgbClr val="000000"/>
-                </a:solidFill>
-              </a:rPr>
-              <a:t>/</a:t>
+              <a:t>/yr1973_X.seer9/</a:t>
             </a:r>
             <a:r>
               <a:rPr lang="en-US" sz="1400" dirty="0" err="1" smtClean="0">
@@ -5917,23 +5836,7 @@
                   <a:srgbClr val="000000"/>
                 </a:solidFill>
               </a:rPr>
-              <a:t>/</a:t>
-            </a:r>
-            <a:r>
-              <a:rPr lang="en-US" sz="1400" dirty="0" smtClean="0">
-                <a:solidFill>
-                  <a:srgbClr val="000000"/>
-                </a:solidFill>
-              </a:rPr>
-              <a:t>yr1992_X.seer9</a:t>
-            </a:r>
-            <a:r>
-              <a:rPr lang="en-US" sz="1400" dirty="0" smtClean="0">
-                <a:solidFill>
-                  <a:srgbClr val="000000"/>
-                </a:solidFill>
-              </a:rPr>
-              <a:t>.plus.sj_la_rg_ak/</a:t>
+              <a:t>/yr1992_X.seer9.plus.sj_la_rg_ak/</a:t>
             </a:r>
             <a:r>
               <a:rPr lang="en-US" sz="1400" dirty="0" err="1" smtClean="0">
@@ -5972,23 +5875,7 @@
                   <a:srgbClr val="000000"/>
                 </a:solidFill>
               </a:rPr>
-              <a:t>/</a:t>
-            </a:r>
-            <a:r>
-              <a:rPr lang="en-US" sz="1400" dirty="0" smtClean="0">
-                <a:solidFill>
-                  <a:srgbClr val="000000"/>
-                </a:solidFill>
-              </a:rPr>
-              <a:t>yr2000_X.ca_ky_lo_nj_ga</a:t>
-            </a:r>
-            <a:r>
-              <a:rPr lang="en-US" sz="1400" dirty="0" smtClean="0">
-                <a:solidFill>
-                  <a:srgbClr val="000000"/>
-                </a:solidFill>
-              </a:rPr>
-              <a:t>/</a:t>
+              <a:t>/yr2000_X.ca_ky_lo_nj_ga/</a:t>
             </a:r>
             <a:r>
               <a:rPr lang="en-US" sz="1400" dirty="0" err="1" smtClean="0">
@@ -6432,6 +6319,467 @@
           </a:p>
         </p:txBody>
       </p:sp>
+      <p:sp>
+        <p:nvSpPr>
+          <p:cNvPr id="46" name="Freeform 45"/>
+          <p:cNvSpPr/>
+          <p:nvPr/>
+        </p:nvSpPr>
+        <p:spPr>
+          <a:xfrm rot="20810694" flipV="1">
+            <a:off x="2904988" y="3652021"/>
+            <a:ext cx="1311639" cy="185568"/>
+          </a:xfrm>
+          <a:custGeom>
+            <a:avLst/>
+            <a:gdLst>
+              <a:gd name="connsiteX0" fmla="*/ 1814188 w 2735224"/>
+              <a:gd name="connsiteY0" fmla="*/ 0 h 1384141"/>
+              <a:gd name="connsiteX1" fmla="*/ 2402016 w 2735224"/>
+              <a:gd name="connsiteY1" fmla="*/ 261257 h 1384141"/>
+              <a:gd name="connsiteX2" fmla="*/ 2402016 w 2735224"/>
+              <a:gd name="connsiteY2" fmla="*/ 261257 h 1384141"/>
+              <a:gd name="connsiteX3" fmla="*/ 2608845 w 2735224"/>
+              <a:gd name="connsiteY3" fmla="*/ 1349829 h 1384141"/>
+              <a:gd name="connsiteX4" fmla="*/ 213988 w 2735224"/>
+              <a:gd name="connsiteY4" fmla="*/ 1110343 h 1384141"/>
+              <a:gd name="connsiteX5" fmla="*/ 116016 w 2735224"/>
+              <a:gd name="connsiteY5" fmla="*/ 1099457 h 1384141"/>
+              <a:gd name="connsiteX6" fmla="*/ 116016 w 2735224"/>
+              <a:gd name="connsiteY6" fmla="*/ 1099457 h 1384141"/>
+              <a:gd name="connsiteX0" fmla="*/ 1814188 w 2864131"/>
+              <a:gd name="connsiteY0" fmla="*/ 0 h 1367927"/>
+              <a:gd name="connsiteX1" fmla="*/ 2402016 w 2864131"/>
+              <a:gd name="connsiteY1" fmla="*/ 261257 h 1367927"/>
+              <a:gd name="connsiteX2" fmla="*/ 2772130 w 2864131"/>
+              <a:gd name="connsiteY2" fmla="*/ 555171 h 1367927"/>
+              <a:gd name="connsiteX3" fmla="*/ 2608845 w 2864131"/>
+              <a:gd name="connsiteY3" fmla="*/ 1349829 h 1367927"/>
+              <a:gd name="connsiteX4" fmla="*/ 213988 w 2864131"/>
+              <a:gd name="connsiteY4" fmla="*/ 1110343 h 1367927"/>
+              <a:gd name="connsiteX5" fmla="*/ 116016 w 2864131"/>
+              <a:gd name="connsiteY5" fmla="*/ 1099457 h 1367927"/>
+              <a:gd name="connsiteX6" fmla="*/ 116016 w 2864131"/>
+              <a:gd name="connsiteY6" fmla="*/ 1099457 h 1367927"/>
+              <a:gd name="connsiteX0" fmla="*/ 1814188 w 2864131"/>
+              <a:gd name="connsiteY0" fmla="*/ 0 h 1367927"/>
+              <a:gd name="connsiteX1" fmla="*/ 2402016 w 2864131"/>
+              <a:gd name="connsiteY1" fmla="*/ 261257 h 1367927"/>
+              <a:gd name="connsiteX2" fmla="*/ 2772130 w 2864131"/>
+              <a:gd name="connsiteY2" fmla="*/ 555171 h 1367927"/>
+              <a:gd name="connsiteX3" fmla="*/ 2608845 w 2864131"/>
+              <a:gd name="connsiteY3" fmla="*/ 1349829 h 1367927"/>
+              <a:gd name="connsiteX4" fmla="*/ 213988 w 2864131"/>
+              <a:gd name="connsiteY4" fmla="*/ 1110343 h 1367927"/>
+              <a:gd name="connsiteX5" fmla="*/ 116016 w 2864131"/>
+              <a:gd name="connsiteY5" fmla="*/ 1099457 h 1367927"/>
+              <a:gd name="connsiteX0" fmla="*/ 1600200 w 2650143"/>
+              <a:gd name="connsiteY0" fmla="*/ 0 h 1367927"/>
+              <a:gd name="connsiteX1" fmla="*/ 2188028 w 2650143"/>
+              <a:gd name="connsiteY1" fmla="*/ 261257 h 1367927"/>
+              <a:gd name="connsiteX2" fmla="*/ 2558142 w 2650143"/>
+              <a:gd name="connsiteY2" fmla="*/ 555171 h 1367927"/>
+              <a:gd name="connsiteX3" fmla="*/ 2394857 w 2650143"/>
+              <a:gd name="connsiteY3" fmla="*/ 1349829 h 1367927"/>
+              <a:gd name="connsiteX4" fmla="*/ 0 w 2650143"/>
+              <a:gd name="connsiteY4" fmla="*/ 1110343 h 1367927"/>
+              <a:gd name="connsiteX0" fmla="*/ 1763485 w 2824357"/>
+              <a:gd name="connsiteY0" fmla="*/ 0 h 1360782"/>
+              <a:gd name="connsiteX1" fmla="*/ 2351313 w 2824357"/>
+              <a:gd name="connsiteY1" fmla="*/ 261257 h 1360782"/>
+              <a:gd name="connsiteX2" fmla="*/ 2721427 w 2824357"/>
+              <a:gd name="connsiteY2" fmla="*/ 555171 h 1360782"/>
+              <a:gd name="connsiteX3" fmla="*/ 2558142 w 2824357"/>
+              <a:gd name="connsiteY3" fmla="*/ 1349829 h 1360782"/>
+              <a:gd name="connsiteX4" fmla="*/ 0 w 2824357"/>
+              <a:gd name="connsiteY4" fmla="*/ 1023257 h 1360782"/>
+              <a:gd name="connsiteX0" fmla="*/ 1763485 w 2886284"/>
+              <a:gd name="connsiteY0" fmla="*/ 0 h 1355724"/>
+              <a:gd name="connsiteX1" fmla="*/ 2351313 w 2886284"/>
+              <a:gd name="connsiteY1" fmla="*/ 261257 h 1355724"/>
+              <a:gd name="connsiteX2" fmla="*/ 2830284 w 2886284"/>
+              <a:gd name="connsiteY2" fmla="*/ 696686 h 1355724"/>
+              <a:gd name="connsiteX3" fmla="*/ 2558142 w 2886284"/>
+              <a:gd name="connsiteY3" fmla="*/ 1349829 h 1355724"/>
+              <a:gd name="connsiteX4" fmla="*/ 0 w 2886284"/>
+              <a:gd name="connsiteY4" fmla="*/ 1023257 h 1355724"/>
+              <a:gd name="connsiteX0" fmla="*/ 1763485 w 2859680"/>
+              <a:gd name="connsiteY0" fmla="*/ 0 h 1354723"/>
+              <a:gd name="connsiteX1" fmla="*/ 2351313 w 2859680"/>
+              <a:gd name="connsiteY1" fmla="*/ 261257 h 1354723"/>
+              <a:gd name="connsiteX2" fmla="*/ 2786741 w 2859680"/>
+              <a:gd name="connsiteY2" fmla="*/ 729344 h 1354723"/>
+              <a:gd name="connsiteX3" fmla="*/ 2558142 w 2859680"/>
+              <a:gd name="connsiteY3" fmla="*/ 1349829 h 1354723"/>
+              <a:gd name="connsiteX4" fmla="*/ 0 w 2859680"/>
+              <a:gd name="connsiteY4" fmla="*/ 1023257 h 1354723"/>
+              <a:gd name="connsiteX0" fmla="*/ 1763485 w 2860698"/>
+              <a:gd name="connsiteY0" fmla="*/ 0 h 1354723"/>
+              <a:gd name="connsiteX1" fmla="*/ 2351313 w 2860698"/>
+              <a:gd name="connsiteY1" fmla="*/ 261257 h 1354723"/>
+              <a:gd name="connsiteX2" fmla="*/ 2786741 w 2860698"/>
+              <a:gd name="connsiteY2" fmla="*/ 729344 h 1354723"/>
+              <a:gd name="connsiteX3" fmla="*/ 2558142 w 2860698"/>
+              <a:gd name="connsiteY3" fmla="*/ 1349829 h 1354723"/>
+              <a:gd name="connsiteX4" fmla="*/ 0 w 2860698"/>
+              <a:gd name="connsiteY4" fmla="*/ 1023257 h 1354723"/>
+              <a:gd name="connsiteX0" fmla="*/ 1763485 w 2882175"/>
+              <a:gd name="connsiteY0" fmla="*/ 0 h 1354723"/>
+              <a:gd name="connsiteX1" fmla="*/ 2351313 w 2882175"/>
+              <a:gd name="connsiteY1" fmla="*/ 261257 h 1354723"/>
+              <a:gd name="connsiteX2" fmla="*/ 2786741 w 2882175"/>
+              <a:gd name="connsiteY2" fmla="*/ 729344 h 1354723"/>
+              <a:gd name="connsiteX3" fmla="*/ 2558142 w 2882175"/>
+              <a:gd name="connsiteY3" fmla="*/ 1349829 h 1354723"/>
+              <a:gd name="connsiteX4" fmla="*/ 0 w 2882175"/>
+              <a:gd name="connsiteY4" fmla="*/ 1023257 h 1354723"/>
+              <a:gd name="connsiteX0" fmla="*/ 1763485 w 3283990"/>
+              <a:gd name="connsiteY0" fmla="*/ 0 h 1354723"/>
+              <a:gd name="connsiteX1" fmla="*/ 2351313 w 3283990"/>
+              <a:gd name="connsiteY1" fmla="*/ 261257 h 1354723"/>
+              <a:gd name="connsiteX2" fmla="*/ 3265713 w 3283990"/>
+              <a:gd name="connsiteY2" fmla="*/ 729344 h 1354723"/>
+              <a:gd name="connsiteX3" fmla="*/ 2558142 w 3283990"/>
+              <a:gd name="connsiteY3" fmla="*/ 1349829 h 1354723"/>
+              <a:gd name="connsiteX4" fmla="*/ 0 w 3283990"/>
+              <a:gd name="connsiteY4" fmla="*/ 1023257 h 1354723"/>
+              <a:gd name="connsiteX0" fmla="*/ 1763485 w 3266612"/>
+              <a:gd name="connsiteY0" fmla="*/ 0 h 1354723"/>
+              <a:gd name="connsiteX1" fmla="*/ 2351313 w 3266612"/>
+              <a:gd name="connsiteY1" fmla="*/ 261257 h 1354723"/>
+              <a:gd name="connsiteX2" fmla="*/ 3265713 w 3266612"/>
+              <a:gd name="connsiteY2" fmla="*/ 729344 h 1354723"/>
+              <a:gd name="connsiteX3" fmla="*/ 2558142 w 3266612"/>
+              <a:gd name="connsiteY3" fmla="*/ 1349829 h 1354723"/>
+              <a:gd name="connsiteX4" fmla="*/ 0 w 3266612"/>
+              <a:gd name="connsiteY4" fmla="*/ 1023257 h 1354723"/>
+              <a:gd name="connsiteX0" fmla="*/ 2351313 w 3266612"/>
+              <a:gd name="connsiteY0" fmla="*/ 0 h 1093466"/>
+              <a:gd name="connsiteX1" fmla="*/ 3265713 w 3266612"/>
+              <a:gd name="connsiteY1" fmla="*/ 468087 h 1093466"/>
+              <a:gd name="connsiteX2" fmla="*/ 2558142 w 3266612"/>
+              <a:gd name="connsiteY2" fmla="*/ 1088572 h 1093466"/>
+              <a:gd name="connsiteX3" fmla="*/ 0 w 3266612"/>
+              <a:gd name="connsiteY3" fmla="*/ 762000 h 1093466"/>
+              <a:gd name="connsiteX0" fmla="*/ 3222170 w 3380035"/>
+              <a:gd name="connsiteY0" fmla="*/ 0 h 1365609"/>
+              <a:gd name="connsiteX1" fmla="*/ 3265713 w 3380035"/>
+              <a:gd name="connsiteY1" fmla="*/ 740230 h 1365609"/>
+              <a:gd name="connsiteX2" fmla="*/ 2558142 w 3380035"/>
+              <a:gd name="connsiteY2" fmla="*/ 1360715 h 1365609"/>
+              <a:gd name="connsiteX3" fmla="*/ 0 w 3380035"/>
+              <a:gd name="connsiteY3" fmla="*/ 1034143 h 1365609"/>
+              <a:gd name="connsiteX0" fmla="*/ 3298370 w 3430690"/>
+              <a:gd name="connsiteY0" fmla="*/ 0 h 1365609"/>
+              <a:gd name="connsiteX1" fmla="*/ 3265713 w 3430690"/>
+              <a:gd name="connsiteY1" fmla="*/ 740230 h 1365609"/>
+              <a:gd name="connsiteX2" fmla="*/ 2558142 w 3430690"/>
+              <a:gd name="connsiteY2" fmla="*/ 1360715 h 1365609"/>
+              <a:gd name="connsiteX3" fmla="*/ 0 w 3430690"/>
+              <a:gd name="connsiteY3" fmla="*/ 1034143 h 1365609"/>
+              <a:gd name="connsiteX0" fmla="*/ 3298370 w 3397684"/>
+              <a:gd name="connsiteY0" fmla="*/ 0 h 1365609"/>
+              <a:gd name="connsiteX1" fmla="*/ 3265713 w 3397684"/>
+              <a:gd name="connsiteY1" fmla="*/ 740230 h 1365609"/>
+              <a:gd name="connsiteX2" fmla="*/ 2558142 w 3397684"/>
+              <a:gd name="connsiteY2" fmla="*/ 1360715 h 1365609"/>
+              <a:gd name="connsiteX3" fmla="*/ 0 w 3397684"/>
+              <a:gd name="connsiteY3" fmla="*/ 1034143 h 1365609"/>
+              <a:gd name="connsiteX0" fmla="*/ 3265713 w 3265713"/>
+              <a:gd name="connsiteY0" fmla="*/ 0 h 625379"/>
+              <a:gd name="connsiteX1" fmla="*/ 2558142 w 3265713"/>
+              <a:gd name="connsiteY1" fmla="*/ 620485 h 625379"/>
+              <a:gd name="connsiteX2" fmla="*/ 0 w 3265713"/>
+              <a:gd name="connsiteY2" fmla="*/ 293913 h 625379"/>
+              <a:gd name="connsiteX0" fmla="*/ 2558142 w 2558142"/>
+              <a:gd name="connsiteY0" fmla="*/ 326572 h 331466"/>
+              <a:gd name="connsiteX1" fmla="*/ 0 w 2558142"/>
+              <a:gd name="connsiteY1" fmla="*/ 0 h 331466"/>
+              <a:gd name="connsiteX0" fmla="*/ 2558142 w 2558142"/>
+              <a:gd name="connsiteY0" fmla="*/ 359229 h 363725"/>
+              <a:gd name="connsiteX1" fmla="*/ 0 w 2558142"/>
+              <a:gd name="connsiteY1" fmla="*/ 0 h 363725"/>
+              <a:gd name="connsiteX0" fmla="*/ 2558142 w 2558142"/>
+              <a:gd name="connsiteY0" fmla="*/ 359229 h 385648"/>
+              <a:gd name="connsiteX1" fmla="*/ 0 w 2558142"/>
+              <a:gd name="connsiteY1" fmla="*/ 0 h 385648"/>
+              <a:gd name="connsiteX0" fmla="*/ 2516953 w 2516953"/>
+              <a:gd name="connsiteY0" fmla="*/ 367466 h 393500"/>
+              <a:gd name="connsiteX1" fmla="*/ 0 w 2516953"/>
+              <a:gd name="connsiteY1" fmla="*/ 0 h 393500"/>
+              <a:gd name="connsiteX0" fmla="*/ 2516953 w 2516953"/>
+              <a:gd name="connsiteY0" fmla="*/ 367466 h 367466"/>
+              <a:gd name="connsiteX1" fmla="*/ 0 w 2516953"/>
+              <a:gd name="connsiteY1" fmla="*/ 0 h 367466"/>
+              <a:gd name="connsiteX0" fmla="*/ 2516953 w 2516953"/>
+              <a:gd name="connsiteY0" fmla="*/ 367466 h 374925"/>
+              <a:gd name="connsiteX1" fmla="*/ 0 w 2516953"/>
+              <a:gd name="connsiteY1" fmla="*/ 0 h 374925"/>
+              <a:gd name="connsiteX0" fmla="*/ 2516953 w 2516953"/>
+              <a:gd name="connsiteY0" fmla="*/ 367466 h 367466"/>
+              <a:gd name="connsiteX1" fmla="*/ 0 w 2516953"/>
+              <a:gd name="connsiteY1" fmla="*/ 0 h 367466"/>
+              <a:gd name="connsiteX0" fmla="*/ 2516953 w 2516953"/>
+              <a:gd name="connsiteY0" fmla="*/ 367466 h 367466"/>
+              <a:gd name="connsiteX1" fmla="*/ 0 w 2516953"/>
+              <a:gd name="connsiteY1" fmla="*/ 0 h 367466"/>
+              <a:gd name="connsiteX0" fmla="*/ 2516953 w 2516953"/>
+              <a:gd name="connsiteY0" fmla="*/ 367466 h 400768"/>
+              <a:gd name="connsiteX1" fmla="*/ 0 w 2516953"/>
+              <a:gd name="connsiteY1" fmla="*/ 0 h 400768"/>
+              <a:gd name="connsiteX0" fmla="*/ 2516953 w 2516953"/>
+              <a:gd name="connsiteY0" fmla="*/ 367466 h 420971"/>
+              <a:gd name="connsiteX1" fmla="*/ 0 w 2516953"/>
+              <a:gd name="connsiteY1" fmla="*/ 0 h 420971"/>
+              <a:gd name="connsiteX0" fmla="*/ 2566573 w 2566573"/>
+              <a:gd name="connsiteY0" fmla="*/ 527079 h 569495"/>
+              <a:gd name="connsiteX1" fmla="*/ 0 w 2566573"/>
+              <a:gd name="connsiteY1" fmla="*/ 0 h 569495"/>
+              <a:gd name="connsiteX0" fmla="*/ 2566573 w 2566573"/>
+              <a:gd name="connsiteY0" fmla="*/ 527079 h 581673"/>
+              <a:gd name="connsiteX1" fmla="*/ 0 w 2566573"/>
+              <a:gd name="connsiteY1" fmla="*/ 0 h 581673"/>
+              <a:gd name="connsiteX0" fmla="*/ 2500412 w 2500412"/>
+              <a:gd name="connsiteY0" fmla="*/ 518678 h 574026"/>
+              <a:gd name="connsiteX1" fmla="*/ 0 w 2500412"/>
+              <a:gd name="connsiteY1" fmla="*/ 0 h 574026"/>
+              <a:gd name="connsiteX0" fmla="*/ 2500412 w 2500412"/>
+              <a:gd name="connsiteY0" fmla="*/ 518678 h 518678"/>
+              <a:gd name="connsiteX1" fmla="*/ 0 w 2500412"/>
+              <a:gd name="connsiteY1" fmla="*/ 0 h 518678"/>
+              <a:gd name="connsiteX0" fmla="*/ 2500412 w 2500412"/>
+              <a:gd name="connsiteY0" fmla="*/ 518678 h 518678"/>
+              <a:gd name="connsiteX1" fmla="*/ 0 w 2500412"/>
+              <a:gd name="connsiteY1" fmla="*/ 0 h 518678"/>
+            </a:gdLst>
+            <a:ahLst/>
+            <a:cxnLst>
+              <a:cxn ang="0">
+                <a:pos x="connsiteX0" y="connsiteY0"/>
+              </a:cxn>
+              <a:cxn ang="0">
+                <a:pos x="connsiteX1" y="connsiteY1"/>
+              </a:cxn>
+            </a:cxnLst>
+            <a:rect l="l" t="t" r="r" b="b"/>
+            <a:pathLst>
+              <a:path w="2500412" h="518678">
+                <a:moveTo>
+                  <a:pt x="2500412" y="518678"/>
+                </a:moveTo>
+                <a:cubicBezTo>
+                  <a:pt x="1683530" y="453204"/>
+                  <a:pt x="902818" y="82910"/>
+                  <a:pt x="0" y="0"/>
+                </a:cubicBezTo>
+              </a:path>
+            </a:pathLst>
+          </a:custGeom>
+          <a:noFill/>
+          <a:ln>
+            <a:solidFill>
+              <a:schemeClr val="tx1"/>
+            </a:solidFill>
+            <a:tailEnd type="arrow"/>
+          </a:ln>
+        </p:spPr>
+        <p:style>
+          <a:lnRef idx="2">
+            <a:schemeClr val="accent1">
+              <a:shade val="50000"/>
+            </a:schemeClr>
+          </a:lnRef>
+          <a:fillRef idx="1">
+            <a:schemeClr val="accent1"/>
+          </a:fillRef>
+          <a:effectRef idx="0">
+            <a:schemeClr val="accent1"/>
+          </a:effectRef>
+          <a:fontRef idx="minor">
+            <a:schemeClr val="lt1"/>
+          </a:fontRef>
+        </p:style>
+        <p:txBody>
+          <a:bodyPr rtlCol="0" anchor="ctr"/>
+          <a:lstStyle/>
+          <a:p>
+            <a:pPr algn="ctr"/>
+            <a:endParaRPr lang="en-US">
+              <a:solidFill>
+                <a:srgbClr val="000000"/>
+              </a:solidFill>
+            </a:endParaRPr>
+          </a:p>
+        </p:txBody>
+      </p:sp>
+      <p:sp>
+        <p:nvSpPr>
+          <p:cNvPr id="2" name="TextBox 1"/>
+          <p:cNvSpPr txBox="1"/>
+          <p:nvPr/>
+        </p:nvSpPr>
+        <p:spPr>
+          <a:xfrm>
+            <a:off x="63500" y="3670300"/>
+            <a:ext cx="1168400" cy="461665"/>
+          </a:xfrm>
+          <a:prstGeom prst="rect">
+            <a:avLst/>
+          </a:prstGeom>
+          <a:noFill/>
+        </p:spPr>
+        <p:txBody>
+          <a:bodyPr wrap="square" rtlCol="0">
+            <a:spAutoFit/>
+          </a:bodyPr>
+          <a:lstStyle/>
+          <a:p>
+            <a:r>
+              <a:rPr lang="en-US" sz="1200" dirty="0" smtClean="0"/>
+              <a:t>extended to ages 85-99</a:t>
+            </a:r>
+            <a:endParaRPr lang="en-US" sz="1200" dirty="0"/>
+          </a:p>
+        </p:txBody>
+      </p:sp>
+      <p:cxnSp>
+        <p:nvCxnSpPr>
+          <p:cNvPr id="47" name="Straight Arrow Connector 46"/>
+          <p:cNvCxnSpPr/>
+          <p:nvPr/>
+        </p:nvCxnSpPr>
+        <p:spPr>
+          <a:xfrm>
+            <a:off x="876300" y="4013200"/>
+            <a:ext cx="342900" cy="1"/>
+          </a:xfrm>
+          <a:prstGeom prst="straightConnector1">
+            <a:avLst/>
+          </a:prstGeom>
+          <a:ln>
+            <a:solidFill>
+              <a:schemeClr val="tx1"/>
+            </a:solidFill>
+            <a:tailEnd type="arrow"/>
+          </a:ln>
+        </p:spPr>
+        <p:style>
+          <a:lnRef idx="1">
+            <a:schemeClr val="accent1"/>
+          </a:lnRef>
+          <a:fillRef idx="0">
+            <a:schemeClr val="accent1"/>
+          </a:fillRef>
+          <a:effectRef idx="0">
+            <a:schemeClr val="accent1"/>
+          </a:effectRef>
+          <a:fontRef idx="minor">
+            <a:schemeClr val="tx1"/>
+          </a:fontRef>
+        </p:style>
+      </p:cxnSp>
+      <p:sp>
+        <p:nvSpPr>
+          <p:cNvPr id="48" name="TextBox 47"/>
+          <p:cNvSpPr txBox="1"/>
+          <p:nvPr/>
+        </p:nvSpPr>
+        <p:spPr>
+          <a:xfrm>
+            <a:off x="50800" y="2616200"/>
+            <a:ext cx="1168400" cy="276999"/>
+          </a:xfrm>
+          <a:prstGeom prst="rect">
+            <a:avLst/>
+          </a:prstGeom>
+          <a:noFill/>
+        </p:spPr>
+        <p:txBody>
+          <a:bodyPr wrap="square" rtlCol="0">
+            <a:spAutoFit/>
+          </a:bodyPr>
+          <a:lstStyle/>
+          <a:p>
+            <a:r>
+              <a:rPr lang="en-US" sz="1200" dirty="0" smtClean="0"/>
+              <a:t>most used</a:t>
+            </a:r>
+            <a:endParaRPr lang="en-US" sz="1200" dirty="0"/>
+          </a:p>
+        </p:txBody>
+      </p:sp>
+      <p:cxnSp>
+        <p:nvCxnSpPr>
+          <p:cNvPr id="49" name="Straight Arrow Connector 48"/>
+          <p:cNvCxnSpPr/>
+          <p:nvPr/>
+        </p:nvCxnSpPr>
+        <p:spPr>
+          <a:xfrm flipV="1">
+            <a:off x="465664" y="1993900"/>
+            <a:ext cx="1515536" cy="699399"/>
+          </a:xfrm>
+          <a:prstGeom prst="straightConnector1">
+            <a:avLst/>
+          </a:prstGeom>
+          <a:ln>
+            <a:solidFill>
+              <a:schemeClr val="tx1"/>
+            </a:solidFill>
+            <a:tailEnd type="arrow"/>
+          </a:ln>
+        </p:spPr>
+        <p:style>
+          <a:lnRef idx="1">
+            <a:schemeClr val="accent1"/>
+          </a:lnRef>
+          <a:fillRef idx="0">
+            <a:schemeClr val="accent1"/>
+          </a:fillRef>
+          <a:effectRef idx="0">
+            <a:schemeClr val="accent1"/>
+          </a:effectRef>
+          <a:fontRef idx="minor">
+            <a:schemeClr val="tx1"/>
+          </a:fontRef>
+        </p:style>
+      </p:cxnSp>
+      <p:cxnSp>
+        <p:nvCxnSpPr>
+          <p:cNvPr id="50" name="Straight Arrow Connector 49"/>
+          <p:cNvCxnSpPr/>
+          <p:nvPr/>
+        </p:nvCxnSpPr>
+        <p:spPr>
+          <a:xfrm>
+            <a:off x="406400" y="2857500"/>
+            <a:ext cx="889000" cy="1117600"/>
+          </a:xfrm>
+          <a:prstGeom prst="straightConnector1">
+            <a:avLst/>
+          </a:prstGeom>
+          <a:ln>
+            <a:solidFill>
+              <a:schemeClr val="tx1"/>
+            </a:solidFill>
+            <a:tailEnd type="arrow"/>
+          </a:ln>
+        </p:spPr>
+        <p:style>
+          <a:lnRef idx="1">
+            <a:schemeClr val="accent1"/>
+          </a:lnRef>
+          <a:fillRef idx="0">
+            <a:schemeClr val="accent1"/>
+          </a:fillRef>
+          <a:effectRef idx="0">
+            <a:schemeClr val="accent1"/>
+          </a:effectRef>
+          <a:fontRef idx="minor">
+            <a:schemeClr val="tx1"/>
+          </a:fontRef>
+        </p:style>
+      </p:cxnSp>
     </p:spTree>
     <p:extLst>
       <p:ext uri="{BB962C8B-B14F-4D97-AF65-F5344CB8AC3E}">

</xml_diff>

<commit_message>
removed popsga support from mkSEER and updated examples to not use age19. This gets agerec and age19 out of canc.
</commit_message>
<xml_diff>
--- a/docs/mkSEERfig.pptx
+++ b/docs/mkSEERfig.pptx
@@ -7,7 +7,7 @@
   <p:sldIdLst>
     <p:sldId id="257" r:id="rId2"/>
   </p:sldIdLst>
-  <p:sldSz cx="7772400" cy="5668963"/>
+  <p:sldSz cx="7772400" cy="4810125"/>
   <p:notesSz cx="6858000" cy="9144000"/>
   <p:defaultTextStyle>
     <a:defPPr>
@@ -136,8 +136,8 @@
         </p:nvSpPr>
         <p:spPr>
           <a:xfrm>
-            <a:off x="582930" y="1761055"/>
-            <a:ext cx="6606540" cy="1215154"/>
+            <a:off x="582930" y="1494258"/>
+            <a:ext cx="6606540" cy="1031060"/>
           </a:xfrm>
         </p:spPr>
         <p:txBody>
@@ -164,8 +164,8 @@
         </p:nvSpPr>
         <p:spPr>
           <a:xfrm>
-            <a:off x="1165860" y="3212417"/>
-            <a:ext cx="5440680" cy="1448735"/>
+            <a:off x="1165860" y="2725743"/>
+            <a:ext cx="5440680" cy="1229254"/>
           </a:xfrm>
         </p:spPr>
         <p:txBody>
@@ -289,7 +289,7 @@
             <a:fld id="{1D8BD707-D9CF-40AE-B4C6-C98DA3205C09}" type="datetimeFigureOut">
               <a:rPr lang="en-US" smtClean="0"/>
               <a:pPr/>
-              <a:t>5/2/15</a:t>
+              <a:t>1/5/16</a:t>
             </a:fld>
             <a:endParaRPr lang="en-US"/>
           </a:p>
@@ -456,7 +456,7 @@
             <a:fld id="{1D8BD707-D9CF-40AE-B4C6-C98DA3205C09}" type="datetimeFigureOut">
               <a:rPr lang="en-US" smtClean="0"/>
               <a:pPr/>
-              <a:t>5/2/15</a:t>
+              <a:t>1/5/16</a:t>
             </a:fld>
             <a:endParaRPr lang="en-US"/>
           </a:p>
@@ -542,8 +542,8 @@
         </p:nvSpPr>
         <p:spPr>
           <a:xfrm>
-            <a:off x="5634990" y="227024"/>
-            <a:ext cx="1748790" cy="4836991"/>
+            <a:off x="5634990" y="192630"/>
+            <a:ext cx="1748790" cy="4104196"/>
           </a:xfrm>
         </p:spPr>
         <p:txBody>
@@ -570,8 +570,8 @@
         </p:nvSpPr>
         <p:spPr>
           <a:xfrm>
-            <a:off x="388620" y="227024"/>
-            <a:ext cx="5116830" cy="4836991"/>
+            <a:off x="388620" y="192630"/>
+            <a:ext cx="5116830" cy="4104196"/>
           </a:xfrm>
         </p:spPr>
         <p:txBody>
@@ -633,7 +633,7 @@
             <a:fld id="{1D8BD707-D9CF-40AE-B4C6-C98DA3205C09}" type="datetimeFigureOut">
               <a:rPr lang="en-US" smtClean="0"/>
               <a:pPr/>
-              <a:t>5/2/15</a:t>
+              <a:t>1/5/16</a:t>
             </a:fld>
             <a:endParaRPr lang="en-US"/>
           </a:p>
@@ -800,7 +800,7 @@
             <a:fld id="{1D8BD707-D9CF-40AE-B4C6-C98DA3205C09}" type="datetimeFigureOut">
               <a:rPr lang="en-US" smtClean="0"/>
               <a:pPr/>
-              <a:t>5/2/15</a:t>
+              <a:t>1/5/16</a:t>
             </a:fld>
             <a:endParaRPr lang="en-US"/>
           </a:p>
@@ -886,8 +886,8 @@
         </p:nvSpPr>
         <p:spPr>
           <a:xfrm>
-            <a:off x="613966" y="3642835"/>
-            <a:ext cx="6606540" cy="1125919"/>
+            <a:off x="613966" y="3090953"/>
+            <a:ext cx="6606540" cy="955344"/>
           </a:xfrm>
         </p:spPr>
         <p:txBody>
@@ -918,8 +918,8 @@
         </p:nvSpPr>
         <p:spPr>
           <a:xfrm>
-            <a:off x="613966" y="2402752"/>
-            <a:ext cx="6606540" cy="1240086"/>
+            <a:off x="613966" y="2038740"/>
+            <a:ext cx="6606540" cy="1052215"/>
           </a:xfrm>
         </p:spPr>
         <p:txBody>
@@ -1043,7 +1043,7 @@
             <a:fld id="{1D8BD707-D9CF-40AE-B4C6-C98DA3205C09}" type="datetimeFigureOut">
               <a:rPr lang="en-US" smtClean="0"/>
               <a:pPr/>
-              <a:t>5/2/15</a:t>
+              <a:t>1/5/16</a:t>
             </a:fld>
             <a:endParaRPr lang="en-US"/>
           </a:p>
@@ -1152,8 +1152,8 @@
         </p:nvSpPr>
         <p:spPr>
           <a:xfrm>
-            <a:off x="388620" y="1322763"/>
-            <a:ext cx="3432810" cy="3741254"/>
+            <a:off x="388620" y="1122367"/>
+            <a:ext cx="3432810" cy="3174460"/>
           </a:xfrm>
         </p:spPr>
         <p:txBody>
@@ -1237,8 +1237,8 @@
         </p:nvSpPr>
         <p:spPr>
           <a:xfrm>
-            <a:off x="3950970" y="1322763"/>
-            <a:ext cx="3432810" cy="3741254"/>
+            <a:off x="3950970" y="1122367"/>
+            <a:ext cx="3432810" cy="3174460"/>
           </a:xfrm>
         </p:spPr>
         <p:txBody>
@@ -1328,7 +1328,7 @@
             <a:fld id="{1D8BD707-D9CF-40AE-B4C6-C98DA3205C09}" type="datetimeFigureOut">
               <a:rPr lang="en-US" smtClean="0"/>
               <a:pPr/>
-              <a:t>5/2/15</a:t>
+              <a:t>1/5/16</a:t>
             </a:fld>
             <a:endParaRPr lang="en-US"/>
           </a:p>
@@ -1441,8 +1441,8 @@
         </p:nvSpPr>
         <p:spPr>
           <a:xfrm>
-            <a:off x="388625" y="1268960"/>
-            <a:ext cx="3434160" cy="528841"/>
+            <a:off x="388625" y="1076716"/>
+            <a:ext cx="3434160" cy="448722"/>
           </a:xfrm>
         </p:spPr>
         <p:txBody>
@@ -1506,8 +1506,8 @@
         </p:nvSpPr>
         <p:spPr>
           <a:xfrm>
-            <a:off x="388625" y="1797803"/>
-            <a:ext cx="3434160" cy="3266215"/>
+            <a:off x="388625" y="1525440"/>
+            <a:ext cx="3434160" cy="2771389"/>
           </a:xfrm>
         </p:spPr>
         <p:txBody>
@@ -1591,8 +1591,8 @@
         </p:nvSpPr>
         <p:spPr>
           <a:xfrm>
-            <a:off x="3948275" y="1268960"/>
-            <a:ext cx="3435509" cy="528841"/>
+            <a:off x="3948277" y="1076716"/>
+            <a:ext cx="3435509" cy="448722"/>
           </a:xfrm>
         </p:spPr>
         <p:txBody>
@@ -1656,8 +1656,8 @@
         </p:nvSpPr>
         <p:spPr>
           <a:xfrm>
-            <a:off x="3948275" y="1797803"/>
-            <a:ext cx="3435509" cy="3266215"/>
+            <a:off x="3948277" y="1525440"/>
+            <a:ext cx="3435509" cy="2771389"/>
           </a:xfrm>
         </p:spPr>
         <p:txBody>
@@ -1747,7 +1747,7 @@
             <a:fld id="{1D8BD707-D9CF-40AE-B4C6-C98DA3205C09}" type="datetimeFigureOut">
               <a:rPr lang="en-US" smtClean="0"/>
               <a:pPr/>
-              <a:t>5/2/15</a:t>
+              <a:t>1/5/16</a:t>
             </a:fld>
             <a:endParaRPr lang="en-US"/>
           </a:p>
@@ -1862,7 +1862,7 @@
             <a:fld id="{1D8BD707-D9CF-40AE-B4C6-C98DA3205C09}" type="datetimeFigureOut">
               <a:rPr lang="en-US" smtClean="0"/>
               <a:pPr/>
-              <a:t>5/2/15</a:t>
+              <a:t>1/5/16</a:t>
             </a:fld>
             <a:endParaRPr lang="en-US"/>
           </a:p>
@@ -1954,7 +1954,7 @@
             <a:fld id="{1D8BD707-D9CF-40AE-B4C6-C98DA3205C09}" type="datetimeFigureOut">
               <a:rPr lang="en-US" smtClean="0"/>
               <a:pPr/>
-              <a:t>5/2/15</a:t>
+              <a:t>1/5/16</a:t>
             </a:fld>
             <a:endParaRPr lang="en-US"/>
           </a:p>
@@ -2040,8 +2040,8 @@
         </p:nvSpPr>
         <p:spPr>
           <a:xfrm>
-            <a:off x="388624" y="225709"/>
-            <a:ext cx="2557066" cy="960574"/>
+            <a:off x="388624" y="191514"/>
+            <a:ext cx="2557066" cy="815049"/>
           </a:xfrm>
         </p:spPr>
         <p:txBody>
@@ -2072,8 +2072,8 @@
         </p:nvSpPr>
         <p:spPr>
           <a:xfrm>
-            <a:off x="3038797" y="225713"/>
-            <a:ext cx="4344988" cy="4838303"/>
+            <a:off x="3038797" y="191518"/>
+            <a:ext cx="4344988" cy="4105309"/>
           </a:xfrm>
         </p:spPr>
         <p:txBody>
@@ -2157,8 +2157,8 @@
         </p:nvSpPr>
         <p:spPr>
           <a:xfrm>
-            <a:off x="388624" y="1186286"/>
-            <a:ext cx="2557066" cy="3877728"/>
+            <a:off x="388624" y="1006566"/>
+            <a:ext cx="2557066" cy="3290259"/>
           </a:xfrm>
         </p:spPr>
         <p:txBody>
@@ -2228,7 +2228,7 @@
             <a:fld id="{1D8BD707-D9CF-40AE-B4C6-C98DA3205C09}" type="datetimeFigureOut">
               <a:rPr lang="en-US" smtClean="0"/>
               <a:pPr/>
-              <a:t>5/2/15</a:t>
+              <a:t>1/5/16</a:t>
             </a:fld>
             <a:endParaRPr lang="en-US"/>
           </a:p>
@@ -2314,8 +2314,8 @@
         </p:nvSpPr>
         <p:spPr>
           <a:xfrm>
-            <a:off x="1523445" y="3968278"/>
-            <a:ext cx="4663440" cy="468477"/>
+            <a:off x="1523445" y="3367091"/>
+            <a:ext cx="4663440" cy="397504"/>
           </a:xfrm>
         </p:spPr>
         <p:txBody>
@@ -2346,8 +2346,8 @@
         </p:nvSpPr>
         <p:spPr>
           <a:xfrm>
-            <a:off x="1523445" y="506533"/>
-            <a:ext cx="4663440" cy="3401378"/>
+            <a:off x="1523445" y="429795"/>
+            <a:ext cx="4663440" cy="2886075"/>
           </a:xfrm>
         </p:spPr>
         <p:txBody>
@@ -2407,8 +2407,8 @@
         </p:nvSpPr>
         <p:spPr>
           <a:xfrm>
-            <a:off x="1523445" y="4436752"/>
-            <a:ext cx="4663440" cy="665316"/>
+            <a:off x="1523445" y="3764592"/>
+            <a:ext cx="4663440" cy="564522"/>
           </a:xfrm>
         </p:spPr>
         <p:txBody>
@@ -2478,7 +2478,7 @@
             <a:fld id="{1D8BD707-D9CF-40AE-B4C6-C98DA3205C09}" type="datetimeFigureOut">
               <a:rPr lang="en-US" smtClean="0"/>
               <a:pPr/>
-              <a:t>5/2/15</a:t>
+              <a:t>1/5/16</a:t>
             </a:fld>
             <a:endParaRPr lang="en-US"/>
           </a:p>
@@ -2569,8 +2569,8 @@
         </p:nvSpPr>
         <p:spPr>
           <a:xfrm>
-            <a:off x="388620" y="227027"/>
-            <a:ext cx="6995160" cy="944827"/>
+            <a:off x="388620" y="192634"/>
+            <a:ext cx="6995160" cy="801687"/>
           </a:xfrm>
           <a:prstGeom prst="rect">
             <a:avLst/>
@@ -2602,8 +2602,8 @@
         </p:nvSpPr>
         <p:spPr>
           <a:xfrm>
-            <a:off x="388620" y="1322763"/>
-            <a:ext cx="6995160" cy="3741254"/>
+            <a:off x="388620" y="1122367"/>
+            <a:ext cx="6995160" cy="3174460"/>
           </a:xfrm>
           <a:prstGeom prst="rect">
             <a:avLst/>
@@ -2664,8 +2664,8 @@
         </p:nvSpPr>
         <p:spPr>
           <a:xfrm>
-            <a:off x="388620" y="5254292"/>
-            <a:ext cx="1813560" cy="301820"/>
+            <a:off x="388620" y="4458276"/>
+            <a:ext cx="1813560" cy="256095"/>
           </a:xfrm>
           <a:prstGeom prst="rect">
             <a:avLst/>
@@ -2688,7 +2688,7 @@
             <a:fld id="{1D8BD707-D9CF-40AE-B4C6-C98DA3205C09}" type="datetimeFigureOut">
               <a:rPr lang="en-US" smtClean="0"/>
               <a:pPr/>
-              <a:t>5/2/15</a:t>
+              <a:t>1/5/16</a:t>
             </a:fld>
             <a:endParaRPr lang="en-US"/>
           </a:p>
@@ -2706,8 +2706,8 @@
         </p:nvSpPr>
         <p:spPr>
           <a:xfrm>
-            <a:off x="2655570" y="5254292"/>
-            <a:ext cx="2461260" cy="301820"/>
+            <a:off x="2655570" y="4458276"/>
+            <a:ext cx="2461260" cy="256095"/>
           </a:xfrm>
           <a:prstGeom prst="rect">
             <a:avLst/>
@@ -2743,8 +2743,8 @@
         </p:nvSpPr>
         <p:spPr>
           <a:xfrm>
-            <a:off x="5570220" y="5254292"/>
-            <a:ext cx="1813560" cy="301820"/>
+            <a:off x="5570220" y="4458276"/>
+            <a:ext cx="1813560" cy="256095"/>
           </a:xfrm>
           <a:prstGeom prst="rect">
             <a:avLst/>
@@ -3061,14 +3061,14 @@
       </p:grpSpPr>
       <p:sp>
         <p:nvSpPr>
-          <p:cNvPr id="24" name="TextBox 23"/>
+          <p:cNvPr id="36" name="TextBox 35"/>
           <p:cNvSpPr txBox="1"/>
           <p:nvPr/>
         </p:nvSpPr>
         <p:spPr>
           <a:xfrm>
-            <a:off x="624718" y="734752"/>
-            <a:ext cx="3790997" cy="738664"/>
+            <a:off x="884739" y="3395116"/>
+            <a:ext cx="2212114" cy="923330"/>
           </a:xfrm>
           <a:prstGeom prst="rect">
             <a:avLst/>
@@ -3087,51 +3087,93 @@
           <a:lstStyle/>
           <a:p>
             <a:r>
-              <a:rPr lang="en-US" sz="1400" dirty="0" smtClean="0">
+              <a:rPr lang="en-US" dirty="0" err="1" smtClean="0">
                 <a:solidFill>
                   <a:srgbClr val="000000"/>
                 </a:solidFill>
               </a:rPr>
-              <a:t>incidence/yr1973_X.seer9/CANCER.TXT</a:t>
-            </a:r>
-          </a:p>
-          <a:p>
-            <a:r>
-              <a:rPr lang="en-US" sz="1400" dirty="0" smtClean="0">
+              <a:t>mrgd</a:t>
+            </a:r>
+            <a:r>
+              <a:rPr lang="en-US" dirty="0" smtClean="0">
                 <a:solidFill>
                   <a:srgbClr val="000000"/>
                 </a:solidFill>
               </a:rPr>
-              <a:t>incidence/yr1992_X.sj_la_rg_ak/CANCER.TXT</a:t>
-            </a:r>
-          </a:p>
-          <a:p>
-            <a:r>
-              <a:rPr lang="en-US" sz="1400" dirty="0" smtClean="0">
+              <a:t>/</a:t>
+            </a:r>
+            <a:r>
+              <a:rPr lang="en-US" dirty="0" err="1" smtClean="0">
                 <a:solidFill>
                   <a:srgbClr val="000000"/>
                 </a:solidFill>
               </a:rPr>
-              <a:t>incidence/yr2000_X.ca_ky_lo_nj_ga/CANCER.TXT</a:t>
-            </a:r>
-            <a:endParaRPr lang="en-US" sz="1400" dirty="0">
+              <a:t>popsa.RData</a:t>
+            </a:r>
+            <a:endParaRPr lang="en-US" dirty="0">
               <a:solidFill>
                 <a:srgbClr val="000000"/>
               </a:solidFill>
             </a:endParaRPr>
           </a:p>
-        </p:txBody>
-      </p:sp>
-      <p:sp>
-        <p:nvSpPr>
-          <p:cNvPr id="25" name="TextBox 24"/>
+          <a:p>
+            <a:r>
+              <a:rPr lang="en-US" dirty="0" smtClean="0">
+                <a:solidFill>
+                  <a:srgbClr val="000000"/>
+                </a:solidFill>
+              </a:rPr>
+              <a:t> </a:t>
+            </a:r>
+            <a:r>
+              <a:rPr lang="en-US" dirty="0" err="1" smtClean="0">
+                <a:solidFill>
+                  <a:srgbClr val="000000"/>
+                </a:solidFill>
+              </a:rPr>
+              <a:t>mrgd</a:t>
+            </a:r>
+            <a:r>
+              <a:rPr lang="en-US" dirty="0">
+                <a:solidFill>
+                  <a:srgbClr val="000000"/>
+                </a:solidFill>
+              </a:rPr>
+              <a:t>/</a:t>
+            </a:r>
+            <a:r>
+              <a:rPr lang="en-US" b="1" dirty="0" err="1" smtClean="0">
+                <a:solidFill>
+                  <a:srgbClr val="000000"/>
+                </a:solidFill>
+              </a:rPr>
+              <a:t>popsae.RData</a:t>
+            </a:r>
+            <a:endParaRPr lang="en-US" b="1" dirty="0">
+              <a:solidFill>
+                <a:srgbClr val="000000"/>
+              </a:solidFill>
+            </a:endParaRPr>
+          </a:p>
+          <a:p>
+            <a:endParaRPr lang="en-US" dirty="0">
+              <a:solidFill>
+                <a:srgbClr val="000000"/>
+              </a:solidFill>
+            </a:endParaRPr>
+          </a:p>
+        </p:txBody>
+      </p:sp>
+      <p:sp>
+        <p:nvSpPr>
+          <p:cNvPr id="35" name="TextBox 34"/>
           <p:cNvSpPr txBox="1"/>
           <p:nvPr/>
         </p:nvSpPr>
         <p:spPr>
           <a:xfrm>
-            <a:off x="922839" y="1502816"/>
-            <a:ext cx="1964513" cy="2893100"/>
+            <a:off x="465639" y="2442616"/>
+            <a:ext cx="2136936" cy="369332"/>
           </a:xfrm>
           <a:prstGeom prst="rect">
             <a:avLst/>
@@ -3149,15 +3191,16 @@
           </a:bodyPr>
           <a:lstStyle/>
           <a:p>
-            <a:endParaRPr lang="en-US" sz="1400" dirty="0" smtClean="0">
-              <a:solidFill>
-                <a:srgbClr val="000000"/>
-              </a:solidFill>
-            </a:endParaRPr>
-          </a:p>
-          <a:p>
-            <a:r>
-              <a:rPr lang="en-US" sz="1400" dirty="0" err="1" smtClean="0">
+            <a:r>
+              <a:rPr lang="en-US" dirty="0" smtClean="0">
+                <a:solidFill>
+                  <a:srgbClr val="000000"/>
+                </a:solidFill>
+              </a:rPr>
+              <a:t>      </a:t>
+            </a:r>
+            <a:r>
+              <a:rPr lang="en-US" dirty="0" err="1" smtClean="0">
                 <a:solidFill>
                   <a:srgbClr val="000000"/>
                 </a:solidFill>
@@ -3165,7 +3208,7 @@
               <a:t>mrgd</a:t>
             </a:r>
             <a:r>
-              <a:rPr lang="en-US" sz="1400" dirty="0" smtClean="0">
+              <a:rPr lang="en-US" dirty="0" smtClean="0">
                 <a:solidFill>
                   <a:srgbClr val="000000"/>
                 </a:solidFill>
@@ -3173,236 +3216,31 @@
               <a:t>/</a:t>
             </a:r>
             <a:r>
-              <a:rPr lang="en-US" sz="1400" b="1" dirty="0" err="1" smtClean="0">
-                <a:solidFill>
-                  <a:srgbClr val="000000"/>
-                </a:solidFill>
-              </a:rPr>
-              <a:t>cancDef.RData</a:t>
-            </a:r>
-            <a:endParaRPr lang="en-US" sz="1400" b="1" dirty="0" smtClean="0">
-              <a:solidFill>
-                <a:srgbClr val="000000"/>
-              </a:solidFill>
-            </a:endParaRPr>
-          </a:p>
-          <a:p>
-            <a:endParaRPr lang="en-US" sz="1400" dirty="0" smtClean="0">
-              <a:solidFill>
-                <a:srgbClr val="000000"/>
-              </a:solidFill>
-            </a:endParaRPr>
-          </a:p>
-          <a:p>
-            <a:endParaRPr lang="en-US" sz="1400" dirty="0">
-              <a:solidFill>
-                <a:srgbClr val="000000"/>
-              </a:solidFill>
-            </a:endParaRPr>
-          </a:p>
-          <a:p>
-            <a:endParaRPr lang="en-US" sz="1400" dirty="0">
-              <a:solidFill>
-                <a:srgbClr val="000000"/>
-              </a:solidFill>
-            </a:endParaRPr>
-          </a:p>
-          <a:p>
-            <a:r>
-              <a:rPr lang="en-US" sz="1400" dirty="0" smtClean="0">
-                <a:solidFill>
-                  <a:srgbClr val="000000"/>
-                </a:solidFill>
-              </a:rPr>
-              <a:t> </a:t>
-            </a:r>
-            <a:r>
-              <a:rPr lang="en-US" sz="1400" dirty="0" err="1" smtClean="0">
-                <a:solidFill>
-                  <a:srgbClr val="000000"/>
-                </a:solidFill>
-              </a:rPr>
-              <a:t>mrgd</a:t>
-            </a:r>
-            <a:r>
-              <a:rPr lang="en-US" sz="1400" dirty="0" smtClean="0">
-                <a:solidFill>
-                  <a:srgbClr val="000000"/>
-                </a:solidFill>
-              </a:rPr>
-              <a:t>/</a:t>
-            </a:r>
-            <a:r>
-              <a:rPr lang="en-US" sz="1400" dirty="0" err="1" smtClean="0">
+              <a:rPr lang="en-US" dirty="0" err="1" smtClean="0">
                 <a:solidFill>
                   <a:srgbClr val="000000"/>
                 </a:solidFill>
               </a:rPr>
               <a:t>cancDef.db</a:t>
             </a:r>
-            <a:endParaRPr lang="en-US" sz="1400" dirty="0">
+            <a:endParaRPr lang="en-US" dirty="0">
               <a:solidFill>
                 <a:srgbClr val="000000"/>
               </a:solidFill>
             </a:endParaRPr>
           </a:p>
-          <a:p>
-            <a:endParaRPr lang="en-US" sz="1400" dirty="0" smtClean="0">
-              <a:solidFill>
-                <a:srgbClr val="000000"/>
-              </a:solidFill>
-            </a:endParaRPr>
-          </a:p>
-          <a:p>
-            <a:endParaRPr lang="en-US" sz="1400" dirty="0">
-              <a:solidFill>
-                <a:srgbClr val="000000"/>
-              </a:solidFill>
-            </a:endParaRPr>
-          </a:p>
-          <a:p>
-            <a:endParaRPr lang="en-US" sz="1400" dirty="0" smtClean="0">
-              <a:solidFill>
-                <a:srgbClr val="000000"/>
-              </a:solidFill>
-            </a:endParaRPr>
-          </a:p>
-          <a:p>
-            <a:r>
-              <a:rPr lang="en-US" sz="1400" dirty="0" smtClean="0">
-                <a:solidFill>
-                  <a:srgbClr val="000000"/>
-                </a:solidFill>
-              </a:rPr>
-              <a:t>       </a:t>
-            </a:r>
-            <a:r>
-              <a:rPr lang="en-US" sz="1400" dirty="0" err="1" smtClean="0">
-                <a:solidFill>
-                  <a:srgbClr val="000000"/>
-                </a:solidFill>
-              </a:rPr>
-              <a:t>mrgd</a:t>
-            </a:r>
-            <a:r>
-              <a:rPr lang="en-US" sz="1400" dirty="0" smtClean="0">
-                <a:solidFill>
-                  <a:srgbClr val="000000"/>
-                </a:solidFill>
-              </a:rPr>
-              <a:t>/</a:t>
-            </a:r>
-            <a:r>
-              <a:rPr lang="en-US" sz="1400" dirty="0" err="1" smtClean="0">
-                <a:solidFill>
-                  <a:srgbClr val="000000"/>
-                </a:solidFill>
-              </a:rPr>
-              <a:t>popga.Rdata</a:t>
-            </a:r>
-            <a:endParaRPr lang="en-US" sz="1400" dirty="0" smtClean="0">
-              <a:solidFill>
-                <a:srgbClr val="000000"/>
-              </a:solidFill>
-            </a:endParaRPr>
-          </a:p>
-          <a:p>
-            <a:r>
-              <a:rPr lang="en-US" sz="1400" dirty="0" smtClean="0">
-                <a:solidFill>
-                  <a:srgbClr val="000000"/>
-                </a:solidFill>
-              </a:rPr>
-              <a:t>       </a:t>
-            </a:r>
-            <a:r>
-              <a:rPr lang="en-US" sz="1400" dirty="0" err="1" smtClean="0">
-                <a:solidFill>
-                  <a:srgbClr val="000000"/>
-                </a:solidFill>
-              </a:rPr>
-              <a:t>mrgd</a:t>
-            </a:r>
-            <a:r>
-              <a:rPr lang="en-US" sz="1400" dirty="0" smtClean="0">
-                <a:solidFill>
-                  <a:srgbClr val="000000"/>
-                </a:solidFill>
-              </a:rPr>
-              <a:t>/</a:t>
-            </a:r>
-            <a:r>
-              <a:rPr lang="en-US" sz="1400" dirty="0" err="1" smtClean="0">
-                <a:solidFill>
-                  <a:srgbClr val="000000"/>
-                </a:solidFill>
-              </a:rPr>
-              <a:t>popsa.RData</a:t>
-            </a:r>
-            <a:endParaRPr lang="en-US" sz="1400" dirty="0">
-              <a:solidFill>
-                <a:srgbClr val="000000"/>
-              </a:solidFill>
-            </a:endParaRPr>
-          </a:p>
-          <a:p>
-            <a:r>
-              <a:rPr lang="en-US" sz="1400" dirty="0" smtClean="0">
-                <a:solidFill>
-                  <a:srgbClr val="000000"/>
-                </a:solidFill>
-              </a:rPr>
-              <a:t>       </a:t>
-            </a:r>
-            <a:r>
-              <a:rPr lang="en-US" sz="1400" dirty="0" err="1" smtClean="0">
-                <a:solidFill>
-                  <a:srgbClr val="000000"/>
-                </a:solidFill>
-              </a:rPr>
-              <a:t>mrgd</a:t>
-            </a:r>
-            <a:r>
-              <a:rPr lang="en-US" sz="1400" dirty="0">
-                <a:solidFill>
-                  <a:srgbClr val="000000"/>
-                </a:solidFill>
-              </a:rPr>
-              <a:t>/</a:t>
-            </a:r>
-            <a:r>
-              <a:rPr lang="en-US" sz="1400" b="1" dirty="0" err="1" smtClean="0">
-                <a:solidFill>
-                  <a:srgbClr val="000000"/>
-                </a:solidFill>
-              </a:rPr>
-              <a:t>popsae.RData</a:t>
-            </a:r>
-            <a:endParaRPr lang="en-US" sz="1400" b="1" dirty="0">
-              <a:solidFill>
-                <a:srgbClr val="000000"/>
-              </a:solidFill>
-            </a:endParaRPr>
-          </a:p>
-          <a:p>
-            <a:endParaRPr lang="en-US" sz="1400" dirty="0">
-              <a:solidFill>
-                <a:srgbClr val="000000"/>
-              </a:solidFill>
-            </a:endParaRPr>
-          </a:p>
-        </p:txBody>
-      </p:sp>
-      <p:sp>
-        <p:nvSpPr>
-          <p:cNvPr id="26" name="TextBox 25"/>
+        </p:txBody>
+      </p:sp>
+      <p:sp>
+        <p:nvSpPr>
+          <p:cNvPr id="75" name="TextBox 74"/>
           <p:cNvSpPr txBox="1"/>
           <p:nvPr/>
         </p:nvSpPr>
         <p:spPr>
           <a:xfrm>
-            <a:off x="311476" y="147580"/>
-            <a:ext cx="2724825" cy="307777"/>
+            <a:off x="535818" y="620452"/>
+            <a:ext cx="4306187" cy="830997"/>
           </a:xfrm>
           <a:prstGeom prst="rect">
             <a:avLst/>
@@ -3421,7 +3259,129 @@
           <a:lstStyle/>
           <a:p>
             <a:r>
-              <a:rPr lang="en-US" sz="1400" dirty="0" smtClean="0">
+              <a:rPr lang="en-US" sz="1600" dirty="0" smtClean="0">
+                <a:solidFill>
+                  <a:srgbClr val="000000"/>
+                </a:solidFill>
+              </a:rPr>
+              <a:t>incidence/yr1973_X.seer9/CANCER.TXT</a:t>
+            </a:r>
+          </a:p>
+          <a:p>
+            <a:r>
+              <a:rPr lang="en-US" sz="1600" dirty="0" smtClean="0">
+                <a:solidFill>
+                  <a:srgbClr val="000000"/>
+                </a:solidFill>
+              </a:rPr>
+              <a:t>incidence/yr1992_X.sj_la_rg_ak/CANCER.TXT</a:t>
+            </a:r>
+          </a:p>
+          <a:p>
+            <a:r>
+              <a:rPr lang="en-US" sz="1600" dirty="0" smtClean="0">
+                <a:solidFill>
+                  <a:srgbClr val="000000"/>
+                </a:solidFill>
+              </a:rPr>
+              <a:t>incidence/yr2000_X.ca_ky_lo_nj_ga/CANCER.TXT</a:t>
+            </a:r>
+            <a:endParaRPr lang="en-US" sz="1600" dirty="0">
+              <a:solidFill>
+                <a:srgbClr val="000000"/>
+              </a:solidFill>
+            </a:endParaRPr>
+          </a:p>
+        </p:txBody>
+      </p:sp>
+      <p:sp>
+        <p:nvSpPr>
+          <p:cNvPr id="76" name="TextBox 75"/>
+          <p:cNvSpPr txBox="1"/>
+          <p:nvPr/>
+        </p:nvSpPr>
+        <p:spPr>
+          <a:xfrm>
+            <a:off x="452939" y="1490116"/>
+            <a:ext cx="2179428" cy="369332"/>
+          </a:xfrm>
+          <a:prstGeom prst="rect">
+            <a:avLst/>
+          </a:prstGeom>
+          <a:noFill/>
+          <a:ln>
+            <a:solidFill>
+              <a:srgbClr val="FFFFFF"/>
+            </a:solidFill>
+          </a:ln>
+        </p:spPr>
+        <p:txBody>
+          <a:bodyPr wrap="none" rtlCol="0">
+            <a:spAutoFit/>
+          </a:bodyPr>
+          <a:lstStyle/>
+          <a:p>
+            <a:r>
+              <a:rPr lang="en-US" dirty="0" err="1" smtClean="0">
+                <a:solidFill>
+                  <a:srgbClr val="000000"/>
+                </a:solidFill>
+              </a:rPr>
+              <a:t>mrgd</a:t>
+            </a:r>
+            <a:r>
+              <a:rPr lang="en-US" dirty="0" smtClean="0">
+                <a:solidFill>
+                  <a:srgbClr val="000000"/>
+                </a:solidFill>
+              </a:rPr>
+              <a:t>/</a:t>
+            </a:r>
+            <a:r>
+              <a:rPr lang="en-US" b="1" dirty="0" err="1" smtClean="0">
+                <a:solidFill>
+                  <a:srgbClr val="000000"/>
+                </a:solidFill>
+              </a:rPr>
+              <a:t>cancDef.RData</a:t>
+            </a:r>
+            <a:endParaRPr lang="en-US" b="1" dirty="0" smtClean="0">
+              <a:solidFill>
+                <a:srgbClr val="000000"/>
+              </a:solidFill>
+            </a:endParaRPr>
+          </a:p>
+        </p:txBody>
+      </p:sp>
+      <p:sp>
+        <p:nvSpPr>
+          <p:cNvPr id="77" name="TextBox 76"/>
+          <p:cNvSpPr txBox="1"/>
+          <p:nvPr/>
+        </p:nvSpPr>
+        <p:spPr>
+          <a:xfrm>
+            <a:off x="425776" y="147580"/>
+            <a:ext cx="3454792" cy="369332"/>
+          </a:xfrm>
+          <a:prstGeom prst="rect">
+            <a:avLst/>
+          </a:prstGeom>
+          <a:noFill/>
+          <a:ln>
+            <a:solidFill>
+              <a:srgbClr val="FFFFFF"/>
+            </a:solidFill>
+          </a:ln>
+        </p:spPr>
+        <p:txBody>
+          <a:bodyPr wrap="none" rtlCol="0">
+            <a:spAutoFit/>
+          </a:bodyPr>
+          <a:lstStyle/>
+          <a:p>
+            <a:r>
+              <a:rPr lang="en-US" dirty="0" smtClean="0">
                 <a:solidFill>
                   <a:srgbClr val="000000"/>
                 </a:solidFill>
@@ -3429,14 +3389,14 @@
               <a:t>incidence/</a:t>
             </a:r>
             <a:r>
-              <a:rPr lang="en-US" sz="1400" dirty="0" err="1" smtClean="0">
+              <a:rPr lang="en-US" dirty="0" err="1" smtClean="0">
                 <a:solidFill>
                   <a:srgbClr val="000000"/>
                 </a:solidFill>
               </a:rPr>
               <a:t>read.seer.research.X.sas</a:t>
             </a:r>
-            <a:endParaRPr lang="en-US" sz="1400" dirty="0">
+            <a:endParaRPr lang="en-US" dirty="0">
               <a:solidFill>
                 <a:srgbClr val="000000"/>
               </a:solidFill>
@@ -3446,13 +3406,13 @@
       </p:sp>
       <p:sp>
         <p:nvSpPr>
-          <p:cNvPr id="27" name="TextBox 26"/>
+          <p:cNvPr id="78" name="TextBox 77"/>
           <p:cNvSpPr txBox="1"/>
           <p:nvPr/>
         </p:nvSpPr>
         <p:spPr>
           <a:xfrm>
-            <a:off x="4324651" y="40485"/>
+            <a:off x="4350051" y="53185"/>
             <a:ext cx="1163900" cy="369332"/>
           </a:xfrm>
           <a:prstGeom prst="rect">
@@ -3497,14 +3457,14 @@
       </p:sp>
       <p:cxnSp>
         <p:nvCxnSpPr>
-          <p:cNvPr id="28" name="Straight Arrow Connector 27"/>
+          <p:cNvPr id="79" name="Straight Arrow Connector 78"/>
           <p:cNvCxnSpPr/>
           <p:nvPr/>
         </p:nvCxnSpPr>
         <p:spPr>
-          <a:xfrm>
-            <a:off x="2942164" y="343799"/>
-            <a:ext cx="2922394" cy="2464"/>
+          <a:xfrm flipV="1">
+            <a:off x="3835400" y="397063"/>
+            <a:ext cx="2054558" cy="9337"/>
           </a:xfrm>
           <a:prstGeom prst="straightConnector1">
             <a:avLst/>
@@ -3533,13 +3493,13 @@
       </p:cxnSp>
       <p:sp>
         <p:nvSpPr>
-          <p:cNvPr id="29" name="TextBox 28"/>
+          <p:cNvPr id="80" name="TextBox 79"/>
           <p:cNvSpPr txBox="1"/>
           <p:nvPr/>
         </p:nvSpPr>
         <p:spPr>
           <a:xfrm>
-            <a:off x="5864558" y="127733"/>
+            <a:off x="5928058" y="153133"/>
             <a:ext cx="1394845" cy="369332"/>
           </a:xfrm>
           <a:prstGeom prst="rect">
@@ -3576,13 +3536,13 @@
       </p:sp>
       <p:sp>
         <p:nvSpPr>
-          <p:cNvPr id="30" name="TextBox 29"/>
+          <p:cNvPr id="81" name="TextBox 80"/>
           <p:cNvSpPr txBox="1"/>
           <p:nvPr/>
         </p:nvSpPr>
         <p:spPr>
           <a:xfrm>
-            <a:off x="6563406" y="429975"/>
+            <a:off x="6538006" y="518875"/>
             <a:ext cx="1239868" cy="369332"/>
           </a:xfrm>
           <a:prstGeom prst="rect">
@@ -3627,13 +3587,13 @@
       </p:sp>
       <p:sp>
         <p:nvSpPr>
-          <p:cNvPr id="31" name="TextBox 30"/>
+          <p:cNvPr id="82" name="TextBox 81"/>
           <p:cNvSpPr txBox="1"/>
           <p:nvPr/>
         </p:nvSpPr>
         <p:spPr>
           <a:xfrm>
-            <a:off x="5806316" y="1051243"/>
+            <a:off x="5806316" y="911543"/>
             <a:ext cx="1938226" cy="369332"/>
           </a:xfrm>
           <a:prstGeom prst="rect">
@@ -3670,14 +3630,14 @@
       </p:sp>
       <p:cxnSp>
         <p:nvCxnSpPr>
-          <p:cNvPr id="32" name="Straight Arrow Connector 31"/>
+          <p:cNvPr id="83" name="Straight Arrow Connector 82"/>
           <p:cNvCxnSpPr/>
           <p:nvPr/>
         </p:nvCxnSpPr>
         <p:spPr>
-          <a:xfrm>
-            <a:off x="6610651" y="531556"/>
-            <a:ext cx="1800" cy="611344"/>
+          <a:xfrm flipH="1">
+            <a:off x="6587051" y="533400"/>
+            <a:ext cx="4249" cy="469800"/>
           </a:xfrm>
           <a:prstGeom prst="straightConnector1">
             <a:avLst/>
@@ -3706,14 +3666,14 @@
       </p:cxnSp>
       <p:sp>
         <p:nvSpPr>
-          <p:cNvPr id="33" name="TextBox 32"/>
+          <p:cNvPr id="84" name="TextBox 83"/>
           <p:cNvSpPr txBox="1"/>
           <p:nvPr/>
         </p:nvSpPr>
         <p:spPr>
           <a:xfrm>
-            <a:off x="5816336" y="2030175"/>
-            <a:ext cx="1009361" cy="369332"/>
+            <a:off x="5867136" y="1941275"/>
+            <a:ext cx="1175171" cy="369332"/>
           </a:xfrm>
           <a:prstGeom prst="rect">
             <a:avLst/>
@@ -3732,7 +3692,7 @@
           <a:lstStyle/>
           <a:p>
             <a:r>
-              <a:rPr lang="en-US" sz="1400" dirty="0" err="1" smtClean="0">
+              <a:rPr lang="en-US" dirty="0" err="1" smtClean="0">
                 <a:solidFill>
                   <a:srgbClr val="000000"/>
                 </a:solidFill>
@@ -3757,13 +3717,13 @@
       </p:sp>
       <p:cxnSp>
         <p:nvCxnSpPr>
-          <p:cNvPr id="34" name="Straight Arrow Connector 33"/>
+          <p:cNvPr id="85" name="Straight Arrow Connector 84"/>
           <p:cNvCxnSpPr/>
           <p:nvPr/>
         </p:nvCxnSpPr>
         <p:spPr>
           <a:xfrm>
-            <a:off x="6610651" y="1420576"/>
+            <a:off x="6610651" y="1280876"/>
             <a:ext cx="0" cy="773668"/>
           </a:xfrm>
           <a:prstGeom prst="straightConnector1">
@@ -3793,130 +3753,14 @@
       </p:cxnSp>
       <p:sp>
         <p:nvSpPr>
-          <p:cNvPr id="35" name="TextBox 34"/>
-          <p:cNvSpPr txBox="1"/>
+          <p:cNvPr id="86" name="Freeform 85"/>
+          <p:cNvSpPr/>
           <p:nvPr/>
         </p:nvSpPr>
         <p:spPr>
           <a:xfrm>
-            <a:off x="25402" y="4106741"/>
-            <a:ext cx="6737567" cy="738664"/>
-          </a:xfrm>
-          <a:prstGeom prst="rect">
-            <a:avLst/>
-          </a:prstGeom>
-          <a:noFill/>
-          <a:ln>
-            <a:solidFill>
-              <a:srgbClr val="FFFFFF"/>
-            </a:solidFill>
-          </a:ln>
-        </p:spPr>
-        <p:txBody>
-          <a:bodyPr wrap="none" rtlCol="0">
-            <a:spAutoFit/>
-          </a:bodyPr>
-          <a:lstStyle/>
-          <a:p>
-            <a:r>
-              <a:rPr lang="en-US" sz="1400" dirty="0" smtClean="0">
-                <a:solidFill>
-                  <a:srgbClr val="000000"/>
-                </a:solidFill>
-              </a:rPr>
-              <a:t>populations/</a:t>
-            </a:r>
-            <a:r>
-              <a:rPr lang="en-US" sz="1400" dirty="0" err="1" smtClean="0">
-                <a:solidFill>
-                  <a:srgbClr val="000000"/>
-                </a:solidFill>
-              </a:rPr>
-              <a:t>white_black_other</a:t>
-            </a:r>
-            <a:r>
-              <a:rPr lang="en-US" sz="1400" dirty="0" smtClean="0">
-                <a:solidFill>
-                  <a:srgbClr val="000000"/>
-                </a:solidFill>
-              </a:rPr>
-              <a:t>/yr1973_X.seer9/19agegroups.txt</a:t>
-            </a:r>
-            <a:endParaRPr lang="en-US" sz="1400" dirty="0">
-              <a:solidFill>
-                <a:srgbClr val="000000"/>
-              </a:solidFill>
-            </a:endParaRPr>
-          </a:p>
-          <a:p>
-            <a:r>
-              <a:rPr lang="en-US" sz="1400" dirty="0" smtClean="0">
-                <a:solidFill>
-                  <a:srgbClr val="000000"/>
-                </a:solidFill>
-              </a:rPr>
-              <a:t>populations/</a:t>
-            </a:r>
-            <a:r>
-              <a:rPr lang="en-US" sz="1400" dirty="0" err="1" smtClean="0">
-                <a:solidFill>
-                  <a:srgbClr val="000000"/>
-                </a:solidFill>
-              </a:rPr>
-              <a:t>expanded.race.by.hispanic</a:t>
-            </a:r>
-            <a:r>
-              <a:rPr lang="en-US" sz="1400" dirty="0" smtClean="0">
-                <a:solidFill>
-                  <a:srgbClr val="000000"/>
-                </a:solidFill>
-              </a:rPr>
-              <a:t>/yr1992_X.seer9.plus.sj_la_rg_ak/19agegroups.txt</a:t>
-            </a:r>
-          </a:p>
-          <a:p>
-            <a:r>
-              <a:rPr lang="en-US" sz="1400" dirty="0" smtClean="0">
-                <a:solidFill>
-                  <a:srgbClr val="000000"/>
-                </a:solidFill>
-              </a:rPr>
-              <a:t>populations/</a:t>
-            </a:r>
-            <a:r>
-              <a:rPr lang="en-US" sz="1400" dirty="0" err="1" smtClean="0">
-                <a:solidFill>
-                  <a:srgbClr val="000000"/>
-                </a:solidFill>
-              </a:rPr>
-              <a:t>expanded.race.by.hispanic</a:t>
-            </a:r>
-            <a:r>
-              <a:rPr lang="en-US" sz="1400" dirty="0" smtClean="0">
-                <a:solidFill>
-                  <a:srgbClr val="000000"/>
-                </a:solidFill>
-              </a:rPr>
-              <a:t>/yr2000_X.ca_ky_lo_nj_ga/19agegroups.txt</a:t>
-            </a:r>
-            <a:endParaRPr lang="en-US" sz="1400" dirty="0">
-              <a:solidFill>
-                <a:srgbClr val="000000"/>
-              </a:solidFill>
-            </a:endParaRPr>
-          </a:p>
-        </p:txBody>
-      </p:sp>
-      <p:sp>
-        <p:nvSpPr>
-          <p:cNvPr id="36" name="Freeform 35"/>
-          <p:cNvSpPr/>
-          <p:nvPr/>
-        </p:nvSpPr>
-        <p:spPr>
-          <a:xfrm>
-            <a:off x="2547865" y="1049998"/>
-            <a:ext cx="3291666" cy="1410027"/>
+            <a:off x="2547865" y="916532"/>
+            <a:ext cx="3291666" cy="1403793"/>
           </a:xfrm>
           <a:custGeom>
             <a:avLst/>
@@ -4191,6 +4035,36 @@
               <a:gd name="connsiteY3" fmla="*/ 1184948 h 1410027"/>
               <a:gd name="connsiteX4" fmla="*/ 0 w 3291666"/>
               <a:gd name="connsiteY4" fmla="*/ 809634 h 1410027"/>
+              <a:gd name="connsiteX0" fmla="*/ 2267251 w 3291666"/>
+              <a:gd name="connsiteY0" fmla="*/ 64131 h 1412636"/>
+              <a:gd name="connsiteX1" fmla="*/ 2723846 w 3291666"/>
+              <a:gd name="connsiteY1" fmla="*/ 24845 h 1412636"/>
+              <a:gd name="connsiteX2" fmla="*/ 3249891 w 3291666"/>
+              <a:gd name="connsiteY2" fmla="*/ 509408 h 1412636"/>
+              <a:gd name="connsiteX3" fmla="*/ 3161334 w 3291666"/>
+              <a:gd name="connsiteY3" fmla="*/ 1187557 h 1412636"/>
+              <a:gd name="connsiteX4" fmla="*/ 0 w 3291666"/>
+              <a:gd name="connsiteY4" fmla="*/ 812243 h 1412636"/>
+              <a:gd name="connsiteX0" fmla="*/ 2381551 w 3291666"/>
+              <a:gd name="connsiteY0" fmla="*/ 64131 h 1412636"/>
+              <a:gd name="connsiteX1" fmla="*/ 2723846 w 3291666"/>
+              <a:gd name="connsiteY1" fmla="*/ 24845 h 1412636"/>
+              <a:gd name="connsiteX2" fmla="*/ 3249891 w 3291666"/>
+              <a:gd name="connsiteY2" fmla="*/ 509408 h 1412636"/>
+              <a:gd name="connsiteX3" fmla="*/ 3161334 w 3291666"/>
+              <a:gd name="connsiteY3" fmla="*/ 1187557 h 1412636"/>
+              <a:gd name="connsiteX4" fmla="*/ 0 w 3291666"/>
+              <a:gd name="connsiteY4" fmla="*/ 812243 h 1412636"/>
+              <a:gd name="connsiteX0" fmla="*/ 2343451 w 3291666"/>
+              <a:gd name="connsiteY0" fmla="*/ 106088 h 1403793"/>
+              <a:gd name="connsiteX1" fmla="*/ 2723846 w 3291666"/>
+              <a:gd name="connsiteY1" fmla="*/ 16002 h 1403793"/>
+              <a:gd name="connsiteX2" fmla="*/ 3249891 w 3291666"/>
+              <a:gd name="connsiteY2" fmla="*/ 500565 h 1403793"/>
+              <a:gd name="connsiteX3" fmla="*/ 3161334 w 3291666"/>
+              <a:gd name="connsiteY3" fmla="*/ 1178714 h 1403793"/>
+              <a:gd name="connsiteX4" fmla="*/ 0 w 3291666"/>
+              <a:gd name="connsiteY4" fmla="*/ 803400 h 1403793"/>
             </a:gdLst>
             <a:ahLst/>
             <a:cxnLst>
@@ -4212,29 +4086,29 @@
             </a:cxnLst>
             <a:rect l="l" t="t" r="r" b="b"/>
             <a:pathLst>
-              <a:path w="3291666" h="1410027">
+              <a:path w="3291666" h="1403793">
                 <a:moveTo>
-                  <a:pt x="2025951" y="74222"/>
+                  <a:pt x="2343451" y="106088"/>
                 </a:moveTo>
                 <a:cubicBezTo>
-                  <a:pt x="2272694" y="76647"/>
-                  <a:pt x="2519856" y="-49860"/>
-                  <a:pt x="2723846" y="22236"/>
+                  <a:pt x="2590194" y="108513"/>
+                  <a:pt x="2572773" y="-49744"/>
+                  <a:pt x="2723846" y="16002"/>
                 </a:cubicBezTo>
                 <a:cubicBezTo>
-                  <a:pt x="2927836" y="94332"/>
-                  <a:pt x="3176976" y="313014"/>
-                  <a:pt x="3249891" y="506799"/>
+                  <a:pt x="2874919" y="81748"/>
+                  <a:pt x="3176976" y="306780"/>
+                  <a:pt x="3249891" y="500565"/>
                 </a:cubicBezTo>
                 <a:cubicBezTo>
-                  <a:pt x="3322806" y="700584"/>
-                  <a:pt x="3304515" y="880590"/>
-                  <a:pt x="3161334" y="1184948"/>
+                  <a:pt x="3322806" y="694350"/>
+                  <a:pt x="3304515" y="874356"/>
+                  <a:pt x="3161334" y="1178714"/>
                 </a:cubicBezTo>
                 <a:cubicBezTo>
-                  <a:pt x="2556834" y="1843533"/>
-                  <a:pt x="415471" y="851363"/>
-                  <a:pt x="0" y="809634"/>
+                  <a:pt x="2556834" y="1837299"/>
+                  <a:pt x="415471" y="845129"/>
+                  <a:pt x="0" y="803400"/>
                 </a:cubicBezTo>
               </a:path>
             </a:pathLst>
@@ -4278,13 +4152,13 @@
       </p:sp>
       <p:sp>
         <p:nvSpPr>
-          <p:cNvPr id="37" name="Freeform 36"/>
+          <p:cNvPr id="87" name="Freeform 86"/>
           <p:cNvSpPr/>
           <p:nvPr/>
         </p:nvSpPr>
         <p:spPr>
           <a:xfrm>
-            <a:off x="2512496" y="2135206"/>
+            <a:off x="2512496" y="1995506"/>
             <a:ext cx="3245970" cy="718165"/>
           </a:xfrm>
           <a:custGeom>
@@ -4635,694 +4509,14 @@
       </p:sp>
       <p:sp>
         <p:nvSpPr>
-          <p:cNvPr id="38" name="Freeform 37"/>
+          <p:cNvPr id="88" name="Freeform 87"/>
           <p:cNvSpPr/>
           <p:nvPr/>
         </p:nvSpPr>
         <p:spPr>
           <a:xfrm>
-            <a:off x="2864876" y="2444439"/>
-            <a:ext cx="4042242" cy="2007304"/>
-          </a:xfrm>
-          <a:custGeom>
-            <a:avLst/>
-            <a:gdLst>
-              <a:gd name="connsiteX0" fmla="*/ 1814188 w 2735224"/>
-              <a:gd name="connsiteY0" fmla="*/ 0 h 1384141"/>
-              <a:gd name="connsiteX1" fmla="*/ 2402016 w 2735224"/>
-              <a:gd name="connsiteY1" fmla="*/ 261257 h 1384141"/>
-              <a:gd name="connsiteX2" fmla="*/ 2402016 w 2735224"/>
-              <a:gd name="connsiteY2" fmla="*/ 261257 h 1384141"/>
-              <a:gd name="connsiteX3" fmla="*/ 2608845 w 2735224"/>
-              <a:gd name="connsiteY3" fmla="*/ 1349829 h 1384141"/>
-              <a:gd name="connsiteX4" fmla="*/ 213988 w 2735224"/>
-              <a:gd name="connsiteY4" fmla="*/ 1110343 h 1384141"/>
-              <a:gd name="connsiteX5" fmla="*/ 116016 w 2735224"/>
-              <a:gd name="connsiteY5" fmla="*/ 1099457 h 1384141"/>
-              <a:gd name="connsiteX6" fmla="*/ 116016 w 2735224"/>
-              <a:gd name="connsiteY6" fmla="*/ 1099457 h 1384141"/>
-              <a:gd name="connsiteX0" fmla="*/ 1814188 w 2864131"/>
-              <a:gd name="connsiteY0" fmla="*/ 0 h 1367927"/>
-              <a:gd name="connsiteX1" fmla="*/ 2402016 w 2864131"/>
-              <a:gd name="connsiteY1" fmla="*/ 261257 h 1367927"/>
-              <a:gd name="connsiteX2" fmla="*/ 2772130 w 2864131"/>
-              <a:gd name="connsiteY2" fmla="*/ 555171 h 1367927"/>
-              <a:gd name="connsiteX3" fmla="*/ 2608845 w 2864131"/>
-              <a:gd name="connsiteY3" fmla="*/ 1349829 h 1367927"/>
-              <a:gd name="connsiteX4" fmla="*/ 213988 w 2864131"/>
-              <a:gd name="connsiteY4" fmla="*/ 1110343 h 1367927"/>
-              <a:gd name="connsiteX5" fmla="*/ 116016 w 2864131"/>
-              <a:gd name="connsiteY5" fmla="*/ 1099457 h 1367927"/>
-              <a:gd name="connsiteX6" fmla="*/ 116016 w 2864131"/>
-              <a:gd name="connsiteY6" fmla="*/ 1099457 h 1367927"/>
-              <a:gd name="connsiteX0" fmla="*/ 1814188 w 2864131"/>
-              <a:gd name="connsiteY0" fmla="*/ 0 h 1367927"/>
-              <a:gd name="connsiteX1" fmla="*/ 2402016 w 2864131"/>
-              <a:gd name="connsiteY1" fmla="*/ 261257 h 1367927"/>
-              <a:gd name="connsiteX2" fmla="*/ 2772130 w 2864131"/>
-              <a:gd name="connsiteY2" fmla="*/ 555171 h 1367927"/>
-              <a:gd name="connsiteX3" fmla="*/ 2608845 w 2864131"/>
-              <a:gd name="connsiteY3" fmla="*/ 1349829 h 1367927"/>
-              <a:gd name="connsiteX4" fmla="*/ 213988 w 2864131"/>
-              <a:gd name="connsiteY4" fmla="*/ 1110343 h 1367927"/>
-              <a:gd name="connsiteX5" fmla="*/ 116016 w 2864131"/>
-              <a:gd name="connsiteY5" fmla="*/ 1099457 h 1367927"/>
-              <a:gd name="connsiteX0" fmla="*/ 1600200 w 2650143"/>
-              <a:gd name="connsiteY0" fmla="*/ 0 h 1367927"/>
-              <a:gd name="connsiteX1" fmla="*/ 2188028 w 2650143"/>
-              <a:gd name="connsiteY1" fmla="*/ 261257 h 1367927"/>
-              <a:gd name="connsiteX2" fmla="*/ 2558142 w 2650143"/>
-              <a:gd name="connsiteY2" fmla="*/ 555171 h 1367927"/>
-              <a:gd name="connsiteX3" fmla="*/ 2394857 w 2650143"/>
-              <a:gd name="connsiteY3" fmla="*/ 1349829 h 1367927"/>
-              <a:gd name="connsiteX4" fmla="*/ 0 w 2650143"/>
-              <a:gd name="connsiteY4" fmla="*/ 1110343 h 1367927"/>
-              <a:gd name="connsiteX0" fmla="*/ 1763485 w 2824357"/>
-              <a:gd name="connsiteY0" fmla="*/ 0 h 1360782"/>
-              <a:gd name="connsiteX1" fmla="*/ 2351313 w 2824357"/>
-              <a:gd name="connsiteY1" fmla="*/ 261257 h 1360782"/>
-              <a:gd name="connsiteX2" fmla="*/ 2721427 w 2824357"/>
-              <a:gd name="connsiteY2" fmla="*/ 555171 h 1360782"/>
-              <a:gd name="connsiteX3" fmla="*/ 2558142 w 2824357"/>
-              <a:gd name="connsiteY3" fmla="*/ 1349829 h 1360782"/>
-              <a:gd name="connsiteX4" fmla="*/ 0 w 2824357"/>
-              <a:gd name="connsiteY4" fmla="*/ 1023257 h 1360782"/>
-              <a:gd name="connsiteX0" fmla="*/ 1763485 w 2886284"/>
-              <a:gd name="connsiteY0" fmla="*/ 0 h 1355724"/>
-              <a:gd name="connsiteX1" fmla="*/ 2351313 w 2886284"/>
-              <a:gd name="connsiteY1" fmla="*/ 261257 h 1355724"/>
-              <a:gd name="connsiteX2" fmla="*/ 2830284 w 2886284"/>
-              <a:gd name="connsiteY2" fmla="*/ 696686 h 1355724"/>
-              <a:gd name="connsiteX3" fmla="*/ 2558142 w 2886284"/>
-              <a:gd name="connsiteY3" fmla="*/ 1349829 h 1355724"/>
-              <a:gd name="connsiteX4" fmla="*/ 0 w 2886284"/>
-              <a:gd name="connsiteY4" fmla="*/ 1023257 h 1355724"/>
-              <a:gd name="connsiteX0" fmla="*/ 1763485 w 2859680"/>
-              <a:gd name="connsiteY0" fmla="*/ 0 h 1354723"/>
-              <a:gd name="connsiteX1" fmla="*/ 2351313 w 2859680"/>
-              <a:gd name="connsiteY1" fmla="*/ 261257 h 1354723"/>
-              <a:gd name="connsiteX2" fmla="*/ 2786741 w 2859680"/>
-              <a:gd name="connsiteY2" fmla="*/ 729344 h 1354723"/>
-              <a:gd name="connsiteX3" fmla="*/ 2558142 w 2859680"/>
-              <a:gd name="connsiteY3" fmla="*/ 1349829 h 1354723"/>
-              <a:gd name="connsiteX4" fmla="*/ 0 w 2859680"/>
-              <a:gd name="connsiteY4" fmla="*/ 1023257 h 1354723"/>
-              <a:gd name="connsiteX0" fmla="*/ 1763485 w 2860698"/>
-              <a:gd name="connsiteY0" fmla="*/ 0 h 1354723"/>
-              <a:gd name="connsiteX1" fmla="*/ 2351313 w 2860698"/>
-              <a:gd name="connsiteY1" fmla="*/ 261257 h 1354723"/>
-              <a:gd name="connsiteX2" fmla="*/ 2786741 w 2860698"/>
-              <a:gd name="connsiteY2" fmla="*/ 729344 h 1354723"/>
-              <a:gd name="connsiteX3" fmla="*/ 2558142 w 2860698"/>
-              <a:gd name="connsiteY3" fmla="*/ 1349829 h 1354723"/>
-              <a:gd name="connsiteX4" fmla="*/ 0 w 2860698"/>
-              <a:gd name="connsiteY4" fmla="*/ 1023257 h 1354723"/>
-              <a:gd name="connsiteX0" fmla="*/ 1763485 w 2882175"/>
-              <a:gd name="connsiteY0" fmla="*/ 0 h 1354723"/>
-              <a:gd name="connsiteX1" fmla="*/ 2351313 w 2882175"/>
-              <a:gd name="connsiteY1" fmla="*/ 261257 h 1354723"/>
-              <a:gd name="connsiteX2" fmla="*/ 2786741 w 2882175"/>
-              <a:gd name="connsiteY2" fmla="*/ 729344 h 1354723"/>
-              <a:gd name="connsiteX3" fmla="*/ 2558142 w 2882175"/>
-              <a:gd name="connsiteY3" fmla="*/ 1349829 h 1354723"/>
-              <a:gd name="connsiteX4" fmla="*/ 0 w 2882175"/>
-              <a:gd name="connsiteY4" fmla="*/ 1023257 h 1354723"/>
-              <a:gd name="connsiteX0" fmla="*/ 1763485 w 2796482"/>
-              <a:gd name="connsiteY0" fmla="*/ 0 h 1027697"/>
-              <a:gd name="connsiteX1" fmla="*/ 2351313 w 2796482"/>
-              <a:gd name="connsiteY1" fmla="*/ 261257 h 1027697"/>
-              <a:gd name="connsiteX2" fmla="*/ 2786741 w 2796482"/>
-              <a:gd name="connsiteY2" fmla="*/ 729344 h 1027697"/>
-              <a:gd name="connsiteX3" fmla="*/ 2405742 w 2796482"/>
-              <a:gd name="connsiteY3" fmla="*/ 751115 h 1027697"/>
-              <a:gd name="connsiteX4" fmla="*/ 0 w 2796482"/>
-              <a:gd name="connsiteY4" fmla="*/ 1023257 h 1027697"/>
-              <a:gd name="connsiteX0" fmla="*/ 4376057 w 4389826"/>
-              <a:gd name="connsiteY0" fmla="*/ 1216121 h 1220773"/>
-              <a:gd name="connsiteX1" fmla="*/ 2351313 w 4389826"/>
-              <a:gd name="connsiteY1" fmla="*/ 18692 h 1220773"/>
-              <a:gd name="connsiteX2" fmla="*/ 2786741 w 4389826"/>
-              <a:gd name="connsiteY2" fmla="*/ 486779 h 1220773"/>
-              <a:gd name="connsiteX3" fmla="*/ 2405742 w 4389826"/>
-              <a:gd name="connsiteY3" fmla="*/ 508550 h 1220773"/>
-              <a:gd name="connsiteX4" fmla="*/ 0 w 4389826"/>
-              <a:gd name="connsiteY4" fmla="*/ 780692 h 1220773"/>
-              <a:gd name="connsiteX0" fmla="*/ 4376057 w 4411372"/>
-              <a:gd name="connsiteY0" fmla="*/ 1504569 h 1508320"/>
-              <a:gd name="connsiteX1" fmla="*/ 3635827 w 4411372"/>
-              <a:gd name="connsiteY1" fmla="*/ 13226 h 1508320"/>
-              <a:gd name="connsiteX2" fmla="*/ 2786741 w 4411372"/>
-              <a:gd name="connsiteY2" fmla="*/ 775227 h 1508320"/>
-              <a:gd name="connsiteX3" fmla="*/ 2405742 w 4411372"/>
-              <a:gd name="connsiteY3" fmla="*/ 796998 h 1508320"/>
-              <a:gd name="connsiteX4" fmla="*/ 0 w 4411372"/>
-              <a:gd name="connsiteY4" fmla="*/ 1069140 h 1508320"/>
-              <a:gd name="connsiteX0" fmla="*/ 4376057 w 4412200"/>
-              <a:gd name="connsiteY0" fmla="*/ 1511295 h 1515095"/>
-              <a:gd name="connsiteX1" fmla="*/ 3635827 w 4412200"/>
-              <a:gd name="connsiteY1" fmla="*/ 19952 h 1515095"/>
-              <a:gd name="connsiteX2" fmla="*/ 2666998 w 4412200"/>
-              <a:gd name="connsiteY2" fmla="*/ 662210 h 1515095"/>
-              <a:gd name="connsiteX3" fmla="*/ 2405742 w 4412200"/>
-              <a:gd name="connsiteY3" fmla="*/ 803724 h 1515095"/>
-              <a:gd name="connsiteX4" fmla="*/ 0 w 4412200"/>
-              <a:gd name="connsiteY4" fmla="*/ 1075866 h 1515095"/>
-              <a:gd name="connsiteX0" fmla="*/ 4376057 w 4412200"/>
-              <a:gd name="connsiteY0" fmla="*/ 1512513 h 1516313"/>
-              <a:gd name="connsiteX1" fmla="*/ 3635827 w 4412200"/>
-              <a:gd name="connsiteY1" fmla="*/ 21170 h 1516313"/>
-              <a:gd name="connsiteX2" fmla="*/ 2666998 w 4412200"/>
-              <a:gd name="connsiteY2" fmla="*/ 663428 h 1516313"/>
-              <a:gd name="connsiteX3" fmla="*/ 0 w 4412200"/>
-              <a:gd name="connsiteY3" fmla="*/ 1077084 h 1516313"/>
-              <a:gd name="connsiteX0" fmla="*/ 4365171 w 4401726"/>
-              <a:gd name="connsiteY0" fmla="*/ 1535192 h 1538947"/>
-              <a:gd name="connsiteX1" fmla="*/ 3635827 w 4401726"/>
-              <a:gd name="connsiteY1" fmla="*/ 22077 h 1538947"/>
-              <a:gd name="connsiteX2" fmla="*/ 2666998 w 4401726"/>
-              <a:gd name="connsiteY2" fmla="*/ 664335 h 1538947"/>
-              <a:gd name="connsiteX3" fmla="*/ 0 w 4401726"/>
-              <a:gd name="connsiteY3" fmla="*/ 1077991 h 1538947"/>
-              <a:gd name="connsiteX0" fmla="*/ 4365171 w 4372676"/>
-              <a:gd name="connsiteY0" fmla="*/ 1535192 h 1535192"/>
-              <a:gd name="connsiteX1" fmla="*/ 3635827 w 4372676"/>
-              <a:gd name="connsiteY1" fmla="*/ 22077 h 1535192"/>
-              <a:gd name="connsiteX2" fmla="*/ 2666998 w 4372676"/>
-              <a:gd name="connsiteY2" fmla="*/ 664335 h 1535192"/>
-              <a:gd name="connsiteX3" fmla="*/ 0 w 4372676"/>
-              <a:gd name="connsiteY3" fmla="*/ 1077991 h 1535192"/>
-              <a:gd name="connsiteX0" fmla="*/ 4365171 w 4365361"/>
-              <a:gd name="connsiteY0" fmla="*/ 1535192 h 1535192"/>
-              <a:gd name="connsiteX1" fmla="*/ 3635827 w 4365361"/>
-              <a:gd name="connsiteY1" fmla="*/ 22077 h 1535192"/>
-              <a:gd name="connsiteX2" fmla="*/ 2666998 w 4365361"/>
-              <a:gd name="connsiteY2" fmla="*/ 664335 h 1535192"/>
-              <a:gd name="connsiteX3" fmla="*/ 0 w 4365361"/>
-              <a:gd name="connsiteY3" fmla="*/ 1077991 h 1535192"/>
-              <a:gd name="connsiteX0" fmla="*/ 4049485 w 4049921"/>
-              <a:gd name="connsiteY0" fmla="*/ 1591937 h 1591937"/>
-              <a:gd name="connsiteX1" fmla="*/ 3635827 w 4049921"/>
-              <a:gd name="connsiteY1" fmla="*/ 24394 h 1591937"/>
-              <a:gd name="connsiteX2" fmla="*/ 2666998 w 4049921"/>
-              <a:gd name="connsiteY2" fmla="*/ 666652 h 1591937"/>
-              <a:gd name="connsiteX3" fmla="*/ 0 w 4049921"/>
-              <a:gd name="connsiteY3" fmla="*/ 1080308 h 1591937"/>
-              <a:gd name="connsiteX0" fmla="*/ 4049485 w 4049921"/>
-              <a:gd name="connsiteY0" fmla="*/ 1590304 h 1590304"/>
-              <a:gd name="connsiteX1" fmla="*/ 3635827 w 4049921"/>
-              <a:gd name="connsiteY1" fmla="*/ 22761 h 1590304"/>
-              <a:gd name="connsiteX2" fmla="*/ 2666998 w 4049921"/>
-              <a:gd name="connsiteY2" fmla="*/ 665019 h 1590304"/>
-              <a:gd name="connsiteX3" fmla="*/ 2295658 w 4049921"/>
-              <a:gd name="connsiteY3" fmla="*/ 748390 h 1590304"/>
-              <a:gd name="connsiteX4" fmla="*/ 0 w 4049921"/>
-              <a:gd name="connsiteY4" fmla="*/ 1078675 h 1590304"/>
-              <a:gd name="connsiteX0" fmla="*/ 4049485 w 4049921"/>
-              <a:gd name="connsiteY0" fmla="*/ 1590304 h 1590304"/>
-              <a:gd name="connsiteX1" fmla="*/ 3635827 w 4049921"/>
-              <a:gd name="connsiteY1" fmla="*/ 22761 h 1590304"/>
-              <a:gd name="connsiteX2" fmla="*/ 2666998 w 4049921"/>
-              <a:gd name="connsiteY2" fmla="*/ 665019 h 1590304"/>
-              <a:gd name="connsiteX3" fmla="*/ 2295658 w 4049921"/>
-              <a:gd name="connsiteY3" fmla="*/ 748390 h 1590304"/>
-              <a:gd name="connsiteX4" fmla="*/ 0 w 4049921"/>
-              <a:gd name="connsiteY4" fmla="*/ 1078675 h 1590304"/>
-              <a:gd name="connsiteX0" fmla="*/ 4049485 w 4050105"/>
-              <a:gd name="connsiteY0" fmla="*/ 1586237 h 1586237"/>
-              <a:gd name="connsiteX1" fmla="*/ 3635827 w 4050105"/>
-              <a:gd name="connsiteY1" fmla="*/ 18694 h 1586237"/>
-              <a:gd name="connsiteX2" fmla="*/ 2295658 w 4050105"/>
-              <a:gd name="connsiteY2" fmla="*/ 744323 h 1586237"/>
-              <a:gd name="connsiteX3" fmla="*/ 0 w 4050105"/>
-              <a:gd name="connsiteY3" fmla="*/ 1074608 h 1586237"/>
-              <a:gd name="connsiteX0" fmla="*/ 4206914 w 4207239"/>
-              <a:gd name="connsiteY0" fmla="*/ 2045874 h 2045874"/>
-              <a:gd name="connsiteX1" fmla="*/ 3635827 w 4207239"/>
-              <a:gd name="connsiteY1" fmla="*/ 37457 h 2045874"/>
-              <a:gd name="connsiteX2" fmla="*/ 2295658 w 4207239"/>
-              <a:gd name="connsiteY2" fmla="*/ 763086 h 2045874"/>
-              <a:gd name="connsiteX3" fmla="*/ 0 w 4207239"/>
-              <a:gd name="connsiteY3" fmla="*/ 1093371 h 2045874"/>
-              <a:gd name="connsiteX0" fmla="*/ 4206914 w 4332546"/>
-              <a:gd name="connsiteY0" fmla="*/ 2045874 h 2047815"/>
-              <a:gd name="connsiteX1" fmla="*/ 3635827 w 4332546"/>
-              <a:gd name="connsiteY1" fmla="*/ 37457 h 2047815"/>
-              <a:gd name="connsiteX2" fmla="*/ 2295658 w 4332546"/>
-              <a:gd name="connsiteY2" fmla="*/ 763086 h 2047815"/>
-              <a:gd name="connsiteX3" fmla="*/ 0 w 4332546"/>
-              <a:gd name="connsiteY3" fmla="*/ 1093371 h 2047815"/>
-              <a:gd name="connsiteX0" fmla="*/ 4023470 w 4172276"/>
-              <a:gd name="connsiteY0" fmla="*/ 2951661 h 2953072"/>
-              <a:gd name="connsiteX1" fmla="*/ 3635827 w 4172276"/>
-              <a:gd name="connsiteY1" fmla="*/ 82574 h 2953072"/>
-              <a:gd name="connsiteX2" fmla="*/ 2295658 w 4172276"/>
-              <a:gd name="connsiteY2" fmla="*/ 808203 h 2953072"/>
-              <a:gd name="connsiteX3" fmla="*/ 0 w 4172276"/>
-              <a:gd name="connsiteY3" fmla="*/ 1138488 h 2953072"/>
-              <a:gd name="connsiteX0" fmla="*/ 3820270 w 3969076"/>
-              <a:gd name="connsiteY0" fmla="*/ 2951661 h 2953072"/>
-              <a:gd name="connsiteX1" fmla="*/ 3432627 w 3969076"/>
-              <a:gd name="connsiteY1" fmla="*/ 82574 h 2953072"/>
-              <a:gd name="connsiteX2" fmla="*/ 2092458 w 3969076"/>
-              <a:gd name="connsiteY2" fmla="*/ 808203 h 2953072"/>
-              <a:gd name="connsiteX3" fmla="*/ 0 w 3969076"/>
-              <a:gd name="connsiteY3" fmla="*/ 1104624 h 2953072"/>
-              <a:gd name="connsiteX0" fmla="*/ 3820270 w 3977322"/>
-              <a:gd name="connsiteY0" fmla="*/ 2901752 h 2903082"/>
-              <a:gd name="connsiteX1" fmla="*/ 3432627 w 3977322"/>
-              <a:gd name="connsiteY1" fmla="*/ 32665 h 2903082"/>
-              <a:gd name="connsiteX2" fmla="*/ 2092458 w 3977322"/>
-              <a:gd name="connsiteY2" fmla="*/ 758294 h 2903082"/>
-              <a:gd name="connsiteX3" fmla="*/ 0 w 3977322"/>
-              <a:gd name="connsiteY3" fmla="*/ 1054715 h 2903082"/>
-              <a:gd name="connsiteX0" fmla="*/ 3828737 w 3985789"/>
-              <a:gd name="connsiteY0" fmla="*/ 2901752 h 2903082"/>
-              <a:gd name="connsiteX1" fmla="*/ 3441094 w 3985789"/>
-              <a:gd name="connsiteY1" fmla="*/ 32665 h 2903082"/>
-              <a:gd name="connsiteX2" fmla="*/ 2100925 w 3985789"/>
-              <a:gd name="connsiteY2" fmla="*/ 758294 h 2903082"/>
-              <a:gd name="connsiteX3" fmla="*/ 0 w 3985789"/>
-              <a:gd name="connsiteY3" fmla="*/ 1190172 h 2903082"/>
-              <a:gd name="connsiteX0" fmla="*/ 3828737 w 4011647"/>
-              <a:gd name="connsiteY0" fmla="*/ 2901752 h 2901752"/>
-              <a:gd name="connsiteX1" fmla="*/ 3441094 w 4011647"/>
-              <a:gd name="connsiteY1" fmla="*/ 32665 h 2901752"/>
-              <a:gd name="connsiteX2" fmla="*/ 2100925 w 4011647"/>
-              <a:gd name="connsiteY2" fmla="*/ 758294 h 2901752"/>
-              <a:gd name="connsiteX3" fmla="*/ 0 w 4011647"/>
-              <a:gd name="connsiteY3" fmla="*/ 1190172 h 2901752"/>
-              <a:gd name="connsiteX0" fmla="*/ 3879537 w 4046347"/>
-              <a:gd name="connsiteY0" fmla="*/ 2951661 h 2951661"/>
-              <a:gd name="connsiteX1" fmla="*/ 3441094 w 4046347"/>
-              <a:gd name="connsiteY1" fmla="*/ 82574 h 2951661"/>
-              <a:gd name="connsiteX2" fmla="*/ 2100925 w 4046347"/>
-              <a:gd name="connsiteY2" fmla="*/ 808203 h 2951661"/>
-              <a:gd name="connsiteX3" fmla="*/ 0 w 4046347"/>
-              <a:gd name="connsiteY3" fmla="*/ 1240081 h 2951661"/>
-              <a:gd name="connsiteX0" fmla="*/ 3879537 w 4022780"/>
-              <a:gd name="connsiteY0" fmla="*/ 3003318 h 3003318"/>
-              <a:gd name="connsiteX1" fmla="*/ 3441094 w 4022780"/>
-              <a:gd name="connsiteY1" fmla="*/ 134231 h 3003318"/>
-              <a:gd name="connsiteX2" fmla="*/ 2100925 w 4022780"/>
-              <a:gd name="connsiteY2" fmla="*/ 859860 h 3003318"/>
-              <a:gd name="connsiteX3" fmla="*/ 0 w 4022780"/>
-              <a:gd name="connsiteY3" fmla="*/ 1291738 h 3003318"/>
-              <a:gd name="connsiteX0" fmla="*/ 3879537 w 4026099"/>
-              <a:gd name="connsiteY0" fmla="*/ 2919563 h 2919563"/>
-              <a:gd name="connsiteX1" fmla="*/ 3466494 w 4026099"/>
-              <a:gd name="connsiteY1" fmla="*/ 143602 h 2919563"/>
-              <a:gd name="connsiteX2" fmla="*/ 2100925 w 4026099"/>
-              <a:gd name="connsiteY2" fmla="*/ 776105 h 2919563"/>
-              <a:gd name="connsiteX3" fmla="*/ 0 w 4026099"/>
-              <a:gd name="connsiteY3" fmla="*/ 1207983 h 2919563"/>
-              <a:gd name="connsiteX0" fmla="*/ 3871070 w 4017632"/>
-              <a:gd name="connsiteY0" fmla="*/ 2919563 h 2919563"/>
-              <a:gd name="connsiteX1" fmla="*/ 3458027 w 4017632"/>
-              <a:gd name="connsiteY1" fmla="*/ 143602 h 2919563"/>
-              <a:gd name="connsiteX2" fmla="*/ 2092458 w 4017632"/>
-              <a:gd name="connsiteY2" fmla="*/ 776105 h 2919563"/>
-              <a:gd name="connsiteX3" fmla="*/ 0 w 4017632"/>
-              <a:gd name="connsiteY3" fmla="*/ 1267245 h 2919563"/>
-              <a:gd name="connsiteX0" fmla="*/ 3871070 w 4017632"/>
-              <a:gd name="connsiteY0" fmla="*/ 2919563 h 2919563"/>
-              <a:gd name="connsiteX1" fmla="*/ 3458027 w 4017632"/>
-              <a:gd name="connsiteY1" fmla="*/ 143602 h 2919563"/>
-              <a:gd name="connsiteX2" fmla="*/ 2092458 w 4017632"/>
-              <a:gd name="connsiteY2" fmla="*/ 776105 h 2919563"/>
-              <a:gd name="connsiteX3" fmla="*/ 0 w 4017632"/>
-              <a:gd name="connsiteY3" fmla="*/ 1267245 h 2919563"/>
-              <a:gd name="connsiteX0" fmla="*/ 3871070 w 4042242"/>
-              <a:gd name="connsiteY0" fmla="*/ 2007304 h 2007304"/>
-              <a:gd name="connsiteX1" fmla="*/ 3458027 w 4042242"/>
-              <a:gd name="connsiteY1" fmla="*/ 44082 h 2007304"/>
-              <a:gd name="connsiteX2" fmla="*/ 2092458 w 4042242"/>
-              <a:gd name="connsiteY2" fmla="*/ 676585 h 2007304"/>
-              <a:gd name="connsiteX3" fmla="*/ 0 w 4042242"/>
-              <a:gd name="connsiteY3" fmla="*/ 1167725 h 2007304"/>
-            </a:gdLst>
-            <a:ahLst/>
-            <a:cxnLst>
-              <a:cxn ang="0">
-                <a:pos x="connsiteX0" y="connsiteY0"/>
-              </a:cxn>
-              <a:cxn ang="0">
-                <a:pos x="connsiteX1" y="connsiteY1"/>
-              </a:cxn>
-              <a:cxn ang="0">
-                <a:pos x="connsiteX2" y="connsiteY2"/>
-              </a:cxn>
-              <a:cxn ang="0">
-                <a:pos x="connsiteX3" y="connsiteY3"/>
-              </a:cxn>
-            </a:cxnLst>
-            <a:rect l="l" t="t" r="r" b="b"/>
-            <a:pathLst>
-              <a:path w="4042242" h="2007304">
-                <a:moveTo>
-                  <a:pt x="3871070" y="2007304"/>
-                </a:moveTo>
-                <a:cubicBezTo>
-                  <a:pt x="4329547" y="2001482"/>
-                  <a:pt x="3754462" y="265868"/>
-                  <a:pt x="3458027" y="44082"/>
-                </a:cubicBezTo>
-                <a:cubicBezTo>
-                  <a:pt x="3161592" y="-177704"/>
-                  <a:pt x="2698429" y="500599"/>
-                  <a:pt x="2092458" y="676585"/>
-                </a:cubicBezTo>
-                <a:cubicBezTo>
-                  <a:pt x="1647958" y="745528"/>
-                  <a:pt x="382610" y="1163474"/>
-                  <a:pt x="0" y="1167725"/>
-                </a:cubicBezTo>
-              </a:path>
-            </a:pathLst>
-          </a:custGeom>
-          <a:noFill/>
-          <a:ln>
-            <a:solidFill>
-              <a:schemeClr val="tx1"/>
-            </a:solidFill>
-            <a:tailEnd type="arrow"/>
-          </a:ln>
-        </p:spPr>
-        <p:style>
-          <a:lnRef idx="2">
-            <a:schemeClr val="accent1">
-              <a:shade val="50000"/>
-            </a:schemeClr>
-          </a:lnRef>
-          <a:fillRef idx="1">
-            <a:schemeClr val="accent1"/>
-          </a:fillRef>
-          <a:effectRef idx="0">
-            <a:schemeClr val="accent1"/>
-          </a:effectRef>
-          <a:fontRef idx="minor">
-            <a:schemeClr val="lt1"/>
-          </a:fontRef>
-        </p:style>
-        <p:txBody>
-          <a:bodyPr rtlCol="0" anchor="ctr"/>
-          <a:lstStyle/>
-          <a:p>
-            <a:pPr algn="ctr"/>
-            <a:endParaRPr lang="en-US">
-              <a:solidFill>
-                <a:srgbClr val="000000"/>
-              </a:solidFill>
-            </a:endParaRPr>
-          </a:p>
-        </p:txBody>
-      </p:sp>
-      <p:sp>
-        <p:nvSpPr>
-          <p:cNvPr id="39" name="Freeform 38"/>
-          <p:cNvSpPr/>
-          <p:nvPr/>
-        </p:nvSpPr>
-        <p:spPr>
-          <a:xfrm>
-            <a:off x="2384641" y="2748927"/>
-            <a:ext cx="2593153" cy="420971"/>
-          </a:xfrm>
-          <a:custGeom>
-            <a:avLst/>
-            <a:gdLst>
-              <a:gd name="connsiteX0" fmla="*/ 1814188 w 2735224"/>
-              <a:gd name="connsiteY0" fmla="*/ 0 h 1384141"/>
-              <a:gd name="connsiteX1" fmla="*/ 2402016 w 2735224"/>
-              <a:gd name="connsiteY1" fmla="*/ 261257 h 1384141"/>
-              <a:gd name="connsiteX2" fmla="*/ 2402016 w 2735224"/>
-              <a:gd name="connsiteY2" fmla="*/ 261257 h 1384141"/>
-              <a:gd name="connsiteX3" fmla="*/ 2608845 w 2735224"/>
-              <a:gd name="connsiteY3" fmla="*/ 1349829 h 1384141"/>
-              <a:gd name="connsiteX4" fmla="*/ 213988 w 2735224"/>
-              <a:gd name="connsiteY4" fmla="*/ 1110343 h 1384141"/>
-              <a:gd name="connsiteX5" fmla="*/ 116016 w 2735224"/>
-              <a:gd name="connsiteY5" fmla="*/ 1099457 h 1384141"/>
-              <a:gd name="connsiteX6" fmla="*/ 116016 w 2735224"/>
-              <a:gd name="connsiteY6" fmla="*/ 1099457 h 1384141"/>
-              <a:gd name="connsiteX0" fmla="*/ 1814188 w 2864131"/>
-              <a:gd name="connsiteY0" fmla="*/ 0 h 1367927"/>
-              <a:gd name="connsiteX1" fmla="*/ 2402016 w 2864131"/>
-              <a:gd name="connsiteY1" fmla="*/ 261257 h 1367927"/>
-              <a:gd name="connsiteX2" fmla="*/ 2772130 w 2864131"/>
-              <a:gd name="connsiteY2" fmla="*/ 555171 h 1367927"/>
-              <a:gd name="connsiteX3" fmla="*/ 2608845 w 2864131"/>
-              <a:gd name="connsiteY3" fmla="*/ 1349829 h 1367927"/>
-              <a:gd name="connsiteX4" fmla="*/ 213988 w 2864131"/>
-              <a:gd name="connsiteY4" fmla="*/ 1110343 h 1367927"/>
-              <a:gd name="connsiteX5" fmla="*/ 116016 w 2864131"/>
-              <a:gd name="connsiteY5" fmla="*/ 1099457 h 1367927"/>
-              <a:gd name="connsiteX6" fmla="*/ 116016 w 2864131"/>
-              <a:gd name="connsiteY6" fmla="*/ 1099457 h 1367927"/>
-              <a:gd name="connsiteX0" fmla="*/ 1814188 w 2864131"/>
-              <a:gd name="connsiteY0" fmla="*/ 0 h 1367927"/>
-              <a:gd name="connsiteX1" fmla="*/ 2402016 w 2864131"/>
-              <a:gd name="connsiteY1" fmla="*/ 261257 h 1367927"/>
-              <a:gd name="connsiteX2" fmla="*/ 2772130 w 2864131"/>
-              <a:gd name="connsiteY2" fmla="*/ 555171 h 1367927"/>
-              <a:gd name="connsiteX3" fmla="*/ 2608845 w 2864131"/>
-              <a:gd name="connsiteY3" fmla="*/ 1349829 h 1367927"/>
-              <a:gd name="connsiteX4" fmla="*/ 213988 w 2864131"/>
-              <a:gd name="connsiteY4" fmla="*/ 1110343 h 1367927"/>
-              <a:gd name="connsiteX5" fmla="*/ 116016 w 2864131"/>
-              <a:gd name="connsiteY5" fmla="*/ 1099457 h 1367927"/>
-              <a:gd name="connsiteX0" fmla="*/ 1600200 w 2650143"/>
-              <a:gd name="connsiteY0" fmla="*/ 0 h 1367927"/>
-              <a:gd name="connsiteX1" fmla="*/ 2188028 w 2650143"/>
-              <a:gd name="connsiteY1" fmla="*/ 261257 h 1367927"/>
-              <a:gd name="connsiteX2" fmla="*/ 2558142 w 2650143"/>
-              <a:gd name="connsiteY2" fmla="*/ 555171 h 1367927"/>
-              <a:gd name="connsiteX3" fmla="*/ 2394857 w 2650143"/>
-              <a:gd name="connsiteY3" fmla="*/ 1349829 h 1367927"/>
-              <a:gd name="connsiteX4" fmla="*/ 0 w 2650143"/>
-              <a:gd name="connsiteY4" fmla="*/ 1110343 h 1367927"/>
-              <a:gd name="connsiteX0" fmla="*/ 1763485 w 2824357"/>
-              <a:gd name="connsiteY0" fmla="*/ 0 h 1360782"/>
-              <a:gd name="connsiteX1" fmla="*/ 2351313 w 2824357"/>
-              <a:gd name="connsiteY1" fmla="*/ 261257 h 1360782"/>
-              <a:gd name="connsiteX2" fmla="*/ 2721427 w 2824357"/>
-              <a:gd name="connsiteY2" fmla="*/ 555171 h 1360782"/>
-              <a:gd name="connsiteX3" fmla="*/ 2558142 w 2824357"/>
-              <a:gd name="connsiteY3" fmla="*/ 1349829 h 1360782"/>
-              <a:gd name="connsiteX4" fmla="*/ 0 w 2824357"/>
-              <a:gd name="connsiteY4" fmla="*/ 1023257 h 1360782"/>
-              <a:gd name="connsiteX0" fmla="*/ 1763485 w 2886284"/>
-              <a:gd name="connsiteY0" fmla="*/ 0 h 1355724"/>
-              <a:gd name="connsiteX1" fmla="*/ 2351313 w 2886284"/>
-              <a:gd name="connsiteY1" fmla="*/ 261257 h 1355724"/>
-              <a:gd name="connsiteX2" fmla="*/ 2830284 w 2886284"/>
-              <a:gd name="connsiteY2" fmla="*/ 696686 h 1355724"/>
-              <a:gd name="connsiteX3" fmla="*/ 2558142 w 2886284"/>
-              <a:gd name="connsiteY3" fmla="*/ 1349829 h 1355724"/>
-              <a:gd name="connsiteX4" fmla="*/ 0 w 2886284"/>
-              <a:gd name="connsiteY4" fmla="*/ 1023257 h 1355724"/>
-              <a:gd name="connsiteX0" fmla="*/ 1763485 w 2859680"/>
-              <a:gd name="connsiteY0" fmla="*/ 0 h 1354723"/>
-              <a:gd name="connsiteX1" fmla="*/ 2351313 w 2859680"/>
-              <a:gd name="connsiteY1" fmla="*/ 261257 h 1354723"/>
-              <a:gd name="connsiteX2" fmla="*/ 2786741 w 2859680"/>
-              <a:gd name="connsiteY2" fmla="*/ 729344 h 1354723"/>
-              <a:gd name="connsiteX3" fmla="*/ 2558142 w 2859680"/>
-              <a:gd name="connsiteY3" fmla="*/ 1349829 h 1354723"/>
-              <a:gd name="connsiteX4" fmla="*/ 0 w 2859680"/>
-              <a:gd name="connsiteY4" fmla="*/ 1023257 h 1354723"/>
-              <a:gd name="connsiteX0" fmla="*/ 1763485 w 2860698"/>
-              <a:gd name="connsiteY0" fmla="*/ 0 h 1354723"/>
-              <a:gd name="connsiteX1" fmla="*/ 2351313 w 2860698"/>
-              <a:gd name="connsiteY1" fmla="*/ 261257 h 1354723"/>
-              <a:gd name="connsiteX2" fmla="*/ 2786741 w 2860698"/>
-              <a:gd name="connsiteY2" fmla="*/ 729344 h 1354723"/>
-              <a:gd name="connsiteX3" fmla="*/ 2558142 w 2860698"/>
-              <a:gd name="connsiteY3" fmla="*/ 1349829 h 1354723"/>
-              <a:gd name="connsiteX4" fmla="*/ 0 w 2860698"/>
-              <a:gd name="connsiteY4" fmla="*/ 1023257 h 1354723"/>
-              <a:gd name="connsiteX0" fmla="*/ 1763485 w 2882175"/>
-              <a:gd name="connsiteY0" fmla="*/ 0 h 1354723"/>
-              <a:gd name="connsiteX1" fmla="*/ 2351313 w 2882175"/>
-              <a:gd name="connsiteY1" fmla="*/ 261257 h 1354723"/>
-              <a:gd name="connsiteX2" fmla="*/ 2786741 w 2882175"/>
-              <a:gd name="connsiteY2" fmla="*/ 729344 h 1354723"/>
-              <a:gd name="connsiteX3" fmla="*/ 2558142 w 2882175"/>
-              <a:gd name="connsiteY3" fmla="*/ 1349829 h 1354723"/>
-              <a:gd name="connsiteX4" fmla="*/ 0 w 2882175"/>
-              <a:gd name="connsiteY4" fmla="*/ 1023257 h 1354723"/>
-              <a:gd name="connsiteX0" fmla="*/ 1763485 w 3283990"/>
-              <a:gd name="connsiteY0" fmla="*/ 0 h 1354723"/>
-              <a:gd name="connsiteX1" fmla="*/ 2351313 w 3283990"/>
-              <a:gd name="connsiteY1" fmla="*/ 261257 h 1354723"/>
-              <a:gd name="connsiteX2" fmla="*/ 3265713 w 3283990"/>
-              <a:gd name="connsiteY2" fmla="*/ 729344 h 1354723"/>
-              <a:gd name="connsiteX3" fmla="*/ 2558142 w 3283990"/>
-              <a:gd name="connsiteY3" fmla="*/ 1349829 h 1354723"/>
-              <a:gd name="connsiteX4" fmla="*/ 0 w 3283990"/>
-              <a:gd name="connsiteY4" fmla="*/ 1023257 h 1354723"/>
-              <a:gd name="connsiteX0" fmla="*/ 1763485 w 3266612"/>
-              <a:gd name="connsiteY0" fmla="*/ 0 h 1354723"/>
-              <a:gd name="connsiteX1" fmla="*/ 2351313 w 3266612"/>
-              <a:gd name="connsiteY1" fmla="*/ 261257 h 1354723"/>
-              <a:gd name="connsiteX2" fmla="*/ 3265713 w 3266612"/>
-              <a:gd name="connsiteY2" fmla="*/ 729344 h 1354723"/>
-              <a:gd name="connsiteX3" fmla="*/ 2558142 w 3266612"/>
-              <a:gd name="connsiteY3" fmla="*/ 1349829 h 1354723"/>
-              <a:gd name="connsiteX4" fmla="*/ 0 w 3266612"/>
-              <a:gd name="connsiteY4" fmla="*/ 1023257 h 1354723"/>
-              <a:gd name="connsiteX0" fmla="*/ 2351313 w 3266612"/>
-              <a:gd name="connsiteY0" fmla="*/ 0 h 1093466"/>
-              <a:gd name="connsiteX1" fmla="*/ 3265713 w 3266612"/>
-              <a:gd name="connsiteY1" fmla="*/ 468087 h 1093466"/>
-              <a:gd name="connsiteX2" fmla="*/ 2558142 w 3266612"/>
-              <a:gd name="connsiteY2" fmla="*/ 1088572 h 1093466"/>
-              <a:gd name="connsiteX3" fmla="*/ 0 w 3266612"/>
-              <a:gd name="connsiteY3" fmla="*/ 762000 h 1093466"/>
-              <a:gd name="connsiteX0" fmla="*/ 3222170 w 3380035"/>
-              <a:gd name="connsiteY0" fmla="*/ 0 h 1365609"/>
-              <a:gd name="connsiteX1" fmla="*/ 3265713 w 3380035"/>
-              <a:gd name="connsiteY1" fmla="*/ 740230 h 1365609"/>
-              <a:gd name="connsiteX2" fmla="*/ 2558142 w 3380035"/>
-              <a:gd name="connsiteY2" fmla="*/ 1360715 h 1365609"/>
-              <a:gd name="connsiteX3" fmla="*/ 0 w 3380035"/>
-              <a:gd name="connsiteY3" fmla="*/ 1034143 h 1365609"/>
-              <a:gd name="connsiteX0" fmla="*/ 3298370 w 3430690"/>
-              <a:gd name="connsiteY0" fmla="*/ 0 h 1365609"/>
-              <a:gd name="connsiteX1" fmla="*/ 3265713 w 3430690"/>
-              <a:gd name="connsiteY1" fmla="*/ 740230 h 1365609"/>
-              <a:gd name="connsiteX2" fmla="*/ 2558142 w 3430690"/>
-              <a:gd name="connsiteY2" fmla="*/ 1360715 h 1365609"/>
-              <a:gd name="connsiteX3" fmla="*/ 0 w 3430690"/>
-              <a:gd name="connsiteY3" fmla="*/ 1034143 h 1365609"/>
-              <a:gd name="connsiteX0" fmla="*/ 3298370 w 3397684"/>
-              <a:gd name="connsiteY0" fmla="*/ 0 h 1365609"/>
-              <a:gd name="connsiteX1" fmla="*/ 3265713 w 3397684"/>
-              <a:gd name="connsiteY1" fmla="*/ 740230 h 1365609"/>
-              <a:gd name="connsiteX2" fmla="*/ 2558142 w 3397684"/>
-              <a:gd name="connsiteY2" fmla="*/ 1360715 h 1365609"/>
-              <a:gd name="connsiteX3" fmla="*/ 0 w 3397684"/>
-              <a:gd name="connsiteY3" fmla="*/ 1034143 h 1365609"/>
-              <a:gd name="connsiteX0" fmla="*/ 3265713 w 3265713"/>
-              <a:gd name="connsiteY0" fmla="*/ 0 h 625379"/>
-              <a:gd name="connsiteX1" fmla="*/ 2558142 w 3265713"/>
-              <a:gd name="connsiteY1" fmla="*/ 620485 h 625379"/>
-              <a:gd name="connsiteX2" fmla="*/ 0 w 3265713"/>
-              <a:gd name="connsiteY2" fmla="*/ 293913 h 625379"/>
-              <a:gd name="connsiteX0" fmla="*/ 2558142 w 2558142"/>
-              <a:gd name="connsiteY0" fmla="*/ 326572 h 331466"/>
-              <a:gd name="connsiteX1" fmla="*/ 0 w 2558142"/>
-              <a:gd name="connsiteY1" fmla="*/ 0 h 331466"/>
-              <a:gd name="connsiteX0" fmla="*/ 2558142 w 2558142"/>
-              <a:gd name="connsiteY0" fmla="*/ 359229 h 363725"/>
-              <a:gd name="connsiteX1" fmla="*/ 0 w 2558142"/>
-              <a:gd name="connsiteY1" fmla="*/ 0 h 363725"/>
-              <a:gd name="connsiteX0" fmla="*/ 2558142 w 2558142"/>
-              <a:gd name="connsiteY0" fmla="*/ 359229 h 385648"/>
-              <a:gd name="connsiteX1" fmla="*/ 0 w 2558142"/>
-              <a:gd name="connsiteY1" fmla="*/ 0 h 385648"/>
-              <a:gd name="connsiteX0" fmla="*/ 2516953 w 2516953"/>
-              <a:gd name="connsiteY0" fmla="*/ 367466 h 393500"/>
-              <a:gd name="connsiteX1" fmla="*/ 0 w 2516953"/>
-              <a:gd name="connsiteY1" fmla="*/ 0 h 393500"/>
-              <a:gd name="connsiteX0" fmla="*/ 2516953 w 2516953"/>
-              <a:gd name="connsiteY0" fmla="*/ 367466 h 367466"/>
-              <a:gd name="connsiteX1" fmla="*/ 0 w 2516953"/>
-              <a:gd name="connsiteY1" fmla="*/ 0 h 367466"/>
-              <a:gd name="connsiteX0" fmla="*/ 2516953 w 2516953"/>
-              <a:gd name="connsiteY0" fmla="*/ 367466 h 374925"/>
-              <a:gd name="connsiteX1" fmla="*/ 0 w 2516953"/>
-              <a:gd name="connsiteY1" fmla="*/ 0 h 374925"/>
-              <a:gd name="connsiteX0" fmla="*/ 2516953 w 2516953"/>
-              <a:gd name="connsiteY0" fmla="*/ 367466 h 367466"/>
-              <a:gd name="connsiteX1" fmla="*/ 0 w 2516953"/>
-              <a:gd name="connsiteY1" fmla="*/ 0 h 367466"/>
-              <a:gd name="connsiteX0" fmla="*/ 2516953 w 2516953"/>
-              <a:gd name="connsiteY0" fmla="*/ 367466 h 367466"/>
-              <a:gd name="connsiteX1" fmla="*/ 0 w 2516953"/>
-              <a:gd name="connsiteY1" fmla="*/ 0 h 367466"/>
-              <a:gd name="connsiteX0" fmla="*/ 2516953 w 2516953"/>
-              <a:gd name="connsiteY0" fmla="*/ 367466 h 400768"/>
-              <a:gd name="connsiteX1" fmla="*/ 0 w 2516953"/>
-              <a:gd name="connsiteY1" fmla="*/ 0 h 400768"/>
-              <a:gd name="connsiteX0" fmla="*/ 2516953 w 2516953"/>
-              <a:gd name="connsiteY0" fmla="*/ 367466 h 420971"/>
-              <a:gd name="connsiteX1" fmla="*/ 0 w 2516953"/>
-              <a:gd name="connsiteY1" fmla="*/ 0 h 420971"/>
-              <a:gd name="connsiteX0" fmla="*/ 2593153 w 2593153"/>
-              <a:gd name="connsiteY0" fmla="*/ 367466 h 420971"/>
-              <a:gd name="connsiteX1" fmla="*/ 0 w 2593153"/>
-              <a:gd name="connsiteY1" fmla="*/ 0 h 420971"/>
-            </a:gdLst>
-            <a:ahLst/>
-            <a:cxnLst>
-              <a:cxn ang="0">
-                <a:pos x="connsiteX0" y="connsiteY0"/>
-              </a:cxn>
-              <a:cxn ang="0">
-                <a:pos x="connsiteX1" y="connsiteY1"/>
-              </a:cxn>
-            </a:cxnLst>
-            <a:rect l="l" t="t" r="r" b="b"/>
-            <a:pathLst>
-              <a:path w="2593153" h="420971">
-                <a:moveTo>
-                  <a:pt x="2593153" y="367466"/>
-                </a:moveTo>
-                <a:cubicBezTo>
-                  <a:pt x="1770645" y="574490"/>
-                  <a:pt x="838984" y="122489"/>
-                  <a:pt x="0" y="0"/>
-                </a:cubicBezTo>
-              </a:path>
-            </a:pathLst>
-          </a:custGeom>
-          <a:noFill/>
-          <a:ln>
-            <a:solidFill>
-              <a:schemeClr val="tx1"/>
-            </a:solidFill>
-            <a:tailEnd type="arrow"/>
-          </a:ln>
-        </p:spPr>
-        <p:style>
-          <a:lnRef idx="2">
-            <a:schemeClr val="accent1">
-              <a:shade val="50000"/>
-            </a:schemeClr>
-          </a:lnRef>
-          <a:fillRef idx="1">
-            <a:schemeClr val="accent1"/>
-          </a:fillRef>
-          <a:effectRef idx="0">
-            <a:schemeClr val="accent1"/>
-          </a:effectRef>
-          <a:fontRef idx="minor">
-            <a:schemeClr val="lt1"/>
-          </a:fontRef>
-        </p:style>
-        <p:txBody>
-          <a:bodyPr rtlCol="0" anchor="ctr"/>
-          <a:lstStyle/>
-          <a:p>
-            <a:pPr algn="ctr"/>
-            <a:endParaRPr lang="en-US">
-              <a:solidFill>
-                <a:srgbClr val="000000"/>
-              </a:solidFill>
-            </a:endParaRPr>
-          </a:p>
-        </p:txBody>
-      </p:sp>
-      <p:sp>
-        <p:nvSpPr>
-          <p:cNvPr id="40" name="Freeform 39"/>
-          <p:cNvSpPr/>
-          <p:nvPr/>
-        </p:nvSpPr>
-        <p:spPr>
-          <a:xfrm>
-            <a:off x="2821774" y="2502792"/>
-            <a:ext cx="4160620" cy="2742766"/>
+            <a:off x="2821774" y="2327771"/>
+            <a:ext cx="4769088" cy="2143099"/>
           </a:xfrm>
           <a:custGeom>
             <a:avLst/>
@@ -5671,6 +4865,38 @@
               <a:gd name="connsiteY2" fmla="*/ 630364 h 2742766"/>
               <a:gd name="connsiteX3" fmla="*/ 0 w 4160620"/>
               <a:gd name="connsiteY3" fmla="*/ 1316177 h 2742766"/>
+              <a:gd name="connsiteX0" fmla="*/ 3768059 w 4018260"/>
+              <a:gd name="connsiteY0" fmla="*/ 2250214 h 2250261"/>
+              <a:gd name="connsiteX1" fmla="*/ 3850315 w 4018260"/>
+              <a:gd name="connsiteY1" fmla="*/ 58492 h 2250261"/>
+              <a:gd name="connsiteX2" fmla="*/ 2834702 w 4018260"/>
+              <a:gd name="connsiteY2" fmla="*/ 671247 h 2250261"/>
+              <a:gd name="connsiteX3" fmla="*/ 0 w 4018260"/>
+              <a:gd name="connsiteY3" fmla="*/ 1357060 h 2250261"/>
+              <a:gd name="connsiteX0" fmla="*/ 3755359 w 4010602"/>
+              <a:gd name="connsiteY0" fmla="*/ 2036016 h 2036068"/>
+              <a:gd name="connsiteX1" fmla="*/ 3850315 w 4010602"/>
+              <a:gd name="connsiteY1" fmla="*/ 47494 h 2036068"/>
+              <a:gd name="connsiteX2" fmla="*/ 2834702 w 4010602"/>
+              <a:gd name="connsiteY2" fmla="*/ 660249 h 2036068"/>
+              <a:gd name="connsiteX3" fmla="*/ 0 w 4010602"/>
+              <a:gd name="connsiteY3" fmla="*/ 1346062 h 2036068"/>
+              <a:gd name="connsiteX0" fmla="*/ 4669759 w 4769088"/>
+              <a:gd name="connsiteY0" fmla="*/ 2183221 h 2183269"/>
+              <a:gd name="connsiteX1" fmla="*/ 3850315 w 4769088"/>
+              <a:gd name="connsiteY1" fmla="*/ 54999 h 2183269"/>
+              <a:gd name="connsiteX2" fmla="*/ 2834702 w 4769088"/>
+              <a:gd name="connsiteY2" fmla="*/ 667754 h 2183269"/>
+              <a:gd name="connsiteX3" fmla="*/ 0 w 4769088"/>
+              <a:gd name="connsiteY3" fmla="*/ 1353567 h 2183269"/>
+              <a:gd name="connsiteX0" fmla="*/ 4669759 w 4769088"/>
+              <a:gd name="connsiteY0" fmla="*/ 2143050 h 2143099"/>
+              <a:gd name="connsiteX1" fmla="*/ 3850315 w 4769088"/>
+              <a:gd name="connsiteY1" fmla="*/ 52928 h 2143099"/>
+              <a:gd name="connsiteX2" fmla="*/ 2834702 w 4769088"/>
+              <a:gd name="connsiteY2" fmla="*/ 665683 h 2143099"/>
+              <a:gd name="connsiteX3" fmla="*/ 0 w 4769088"/>
+              <a:gd name="connsiteY3" fmla="*/ 1351496 h 2143099"/>
             </a:gdLst>
             <a:ahLst/>
             <a:cxnLst>
@@ -5689,24 +4915,24 @@
             </a:cxnLst>
             <a:rect l="l" t="t" r="r" b="b"/>
             <a:pathLst>
-              <a:path w="4160620" h="2742766">
+              <a:path w="4769088" h="2143099">
                 <a:moveTo>
-                  <a:pt x="3780759" y="2742731"/>
+                  <a:pt x="4669759" y="2143050"/>
                 </a:moveTo>
                 <a:cubicBezTo>
-                  <a:pt x="4179970" y="2753841"/>
-                  <a:pt x="4355124" y="141087"/>
-                  <a:pt x="3850315" y="17609"/>
+                  <a:pt x="5068970" y="2154160"/>
+                  <a:pt x="4156158" y="299156"/>
+                  <a:pt x="3850315" y="52928"/>
                 </a:cubicBezTo>
                 <a:cubicBezTo>
-                  <a:pt x="3345506" y="-105869"/>
-                  <a:pt x="3440673" y="454378"/>
-                  <a:pt x="2834702" y="630364"/>
+                  <a:pt x="3544472" y="-193300"/>
+                  <a:pt x="3440673" y="489697"/>
+                  <a:pt x="2834702" y="665683"/>
                 </a:cubicBezTo>
                 <a:cubicBezTo>
-                  <a:pt x="2390202" y="699307"/>
-                  <a:pt x="382610" y="1294994"/>
-                  <a:pt x="0" y="1316177"/>
+                  <a:pt x="2390202" y="734626"/>
+                  <a:pt x="382610" y="1330313"/>
+                  <a:pt x="0" y="1351496"/>
                 </a:cubicBezTo>
               </a:path>
             </a:pathLst>
@@ -5750,14 +4976,14 @@
       </p:sp>
       <p:sp>
         <p:nvSpPr>
-          <p:cNvPr id="41" name="TextBox 40"/>
+          <p:cNvPr id="89" name="TextBox 88"/>
           <p:cNvSpPr txBox="1"/>
           <p:nvPr/>
         </p:nvSpPr>
         <p:spPr>
           <a:xfrm>
-            <a:off x="8467" y="4864505"/>
-            <a:ext cx="6545932" cy="738664"/>
+            <a:off x="-16933" y="4013605"/>
+            <a:ext cx="7455887" cy="830997"/>
           </a:xfrm>
           <a:prstGeom prst="rect">
             <a:avLst/>
@@ -5776,7 +5002,7 @@
           <a:lstStyle/>
           <a:p>
             <a:r>
-              <a:rPr lang="en-US" sz="1400" dirty="0" smtClean="0">
+              <a:rPr lang="en-US" sz="1600" dirty="0" smtClean="0">
                 <a:solidFill>
                   <a:srgbClr val="000000"/>
                 </a:solidFill>
@@ -5784,7 +5010,7 @@
               <a:t>populations/</a:t>
             </a:r>
             <a:r>
-              <a:rPr lang="en-US" sz="1400" dirty="0" err="1" smtClean="0">
+              <a:rPr lang="en-US" sz="1600" dirty="0" err="1" smtClean="0">
                 <a:solidFill>
                   <a:srgbClr val="000000"/>
                 </a:solidFill>
@@ -5792,7 +5018,7 @@
               <a:t>white_black_other</a:t>
             </a:r>
             <a:r>
-              <a:rPr lang="en-US" sz="1400" dirty="0" smtClean="0">
+              <a:rPr lang="en-US" sz="1600" dirty="0" smtClean="0">
                 <a:solidFill>
                   <a:srgbClr val="000000"/>
                 </a:solidFill>
@@ -5800,14 +5026,14 @@
               <a:t>/yr1973_X.seer9/</a:t>
             </a:r>
             <a:r>
-              <a:rPr lang="en-US" sz="1400" dirty="0" err="1" smtClean="0">
+              <a:rPr lang="en-US" sz="1600" dirty="0" err="1" smtClean="0">
                 <a:solidFill>
                   <a:srgbClr val="000000"/>
                 </a:solidFill>
               </a:rPr>
               <a:t>singleages.txt</a:t>
             </a:r>
-            <a:endParaRPr lang="en-US" sz="1400" dirty="0">
+            <a:endParaRPr lang="en-US" sz="1600" dirty="0">
               <a:solidFill>
                 <a:srgbClr val="000000"/>
               </a:solidFill>
@@ -5815,7 +5041,7 @@
           </a:p>
           <a:p>
             <a:r>
-              <a:rPr lang="en-US" sz="1400" dirty="0" smtClean="0">
+              <a:rPr lang="en-US" sz="1600" dirty="0" smtClean="0">
                 <a:solidFill>
                   <a:srgbClr val="000000"/>
                 </a:solidFill>
@@ -5823,7 +5049,7 @@
               <a:t>populations/</a:t>
             </a:r>
             <a:r>
-              <a:rPr lang="en-US" sz="1400" dirty="0" err="1" smtClean="0">
+              <a:rPr lang="en-US" sz="1600" dirty="0" err="1" smtClean="0">
                 <a:solidFill>
                   <a:srgbClr val="000000"/>
                 </a:solidFill>
@@ -5831,7 +5057,7 @@
               <a:t>expanded.race.by.hispanic</a:t>
             </a:r>
             <a:r>
-              <a:rPr lang="en-US" sz="1400" dirty="0" smtClean="0">
+              <a:rPr lang="en-US" sz="1600" dirty="0" smtClean="0">
                 <a:solidFill>
                   <a:srgbClr val="000000"/>
                 </a:solidFill>
@@ -5839,14 +5065,14 @@
               <a:t>/yr1992_X.seer9.plus.sj_la_rg_ak/</a:t>
             </a:r>
             <a:r>
-              <a:rPr lang="en-US" sz="1400" dirty="0" err="1" smtClean="0">
+              <a:rPr lang="en-US" sz="1600" dirty="0" err="1" smtClean="0">
                 <a:solidFill>
                   <a:srgbClr val="000000"/>
                 </a:solidFill>
               </a:rPr>
               <a:t>singleages.txt</a:t>
             </a:r>
-            <a:endParaRPr lang="en-US" sz="1400" dirty="0" smtClean="0">
+            <a:endParaRPr lang="en-US" sz="1600" dirty="0" smtClean="0">
               <a:solidFill>
                 <a:srgbClr val="000000"/>
               </a:solidFill>
@@ -5854,7 +5080,7 @@
           </a:p>
           <a:p>
             <a:r>
-              <a:rPr lang="en-US" sz="1400" dirty="0" smtClean="0">
+              <a:rPr lang="en-US" sz="1600" dirty="0" smtClean="0">
                 <a:solidFill>
                   <a:srgbClr val="000000"/>
                 </a:solidFill>
@@ -5862,7 +5088,7 @@
               <a:t>populations/</a:t>
             </a:r>
             <a:r>
-              <a:rPr lang="en-US" sz="1400" dirty="0" err="1" smtClean="0">
+              <a:rPr lang="en-US" sz="1600" dirty="0" err="1" smtClean="0">
                 <a:solidFill>
                   <a:srgbClr val="000000"/>
                 </a:solidFill>
@@ -5870,7 +5096,7 @@
               <a:t>expanded.race.by.hispanic</a:t>
             </a:r>
             <a:r>
-              <a:rPr lang="en-US" sz="1400" dirty="0" smtClean="0">
+              <a:rPr lang="en-US" sz="1600" dirty="0" smtClean="0">
                 <a:solidFill>
                   <a:srgbClr val="000000"/>
                 </a:solidFill>
@@ -5878,14 +5104,14 @@
               <a:t>/yr2000_X.ca_ky_lo_nj_ga/</a:t>
             </a:r>
             <a:r>
-              <a:rPr lang="en-US" sz="1400" dirty="0" err="1" smtClean="0">
+              <a:rPr lang="en-US" sz="1600" dirty="0" err="1" smtClean="0">
                 <a:solidFill>
                   <a:srgbClr val="000000"/>
                 </a:solidFill>
               </a:rPr>
               <a:t>singleages.txt</a:t>
             </a:r>
-            <a:endParaRPr lang="en-US" sz="1400" dirty="0">
+            <a:endParaRPr lang="en-US" sz="1600" dirty="0">
               <a:solidFill>
                 <a:srgbClr val="000000"/>
               </a:solidFill>
@@ -5895,13 +5121,13 @@
       </p:sp>
       <p:sp>
         <p:nvSpPr>
-          <p:cNvPr id="42" name="Freeform 41"/>
+          <p:cNvPr id="90" name="Freeform 89"/>
           <p:cNvSpPr/>
           <p:nvPr/>
         </p:nvSpPr>
         <p:spPr>
           <a:xfrm rot="21342727">
-            <a:off x="2525875" y="2828869"/>
+            <a:off x="2525875" y="2689169"/>
             <a:ext cx="2559877" cy="578494"/>
           </a:xfrm>
           <a:custGeom>
@@ -6180,14 +5406,14 @@
       </p:sp>
       <p:sp>
         <p:nvSpPr>
-          <p:cNvPr id="43" name="Right Brace 42"/>
+          <p:cNvPr id="91" name="Right Brace 90"/>
           <p:cNvSpPr/>
           <p:nvPr/>
         </p:nvSpPr>
         <p:spPr>
           <a:xfrm>
-            <a:off x="6587052" y="4156825"/>
-            <a:ext cx="143935" cy="584225"/>
+            <a:off x="7285554" y="4127500"/>
+            <a:ext cx="220146" cy="682625"/>
           </a:xfrm>
           <a:prstGeom prst="rightBrace">
             <a:avLst/>
@@ -6227,14 +5453,14 @@
       </p:sp>
       <p:sp>
         <p:nvSpPr>
-          <p:cNvPr id="44" name="Right Brace 43"/>
+          <p:cNvPr id="92" name="Right Brace 91"/>
           <p:cNvSpPr/>
           <p:nvPr/>
         </p:nvSpPr>
         <p:spPr>
           <a:xfrm>
-            <a:off x="6460054" y="4952643"/>
-            <a:ext cx="143936" cy="592611"/>
+            <a:off x="4724382" y="613783"/>
+            <a:ext cx="190518" cy="821317"/>
           </a:xfrm>
           <a:prstGeom prst="rightBrace">
             <a:avLst/>
@@ -6274,60 +5500,13 @@
       </p:sp>
       <p:sp>
         <p:nvSpPr>
-          <p:cNvPr id="45" name="Right Brace 44"/>
+          <p:cNvPr id="93" name="Freeform 92"/>
           <p:cNvSpPr/>
           <p:nvPr/>
         </p:nvSpPr>
         <p:spPr>
-          <a:xfrm>
-            <a:off x="4419582" y="829683"/>
-            <a:ext cx="143935" cy="584225"/>
-          </a:xfrm>
-          <a:prstGeom prst="rightBrace">
-            <a:avLst/>
-          </a:prstGeom>
-          <a:ln>
-            <a:solidFill>
-              <a:schemeClr val="tx1"/>
-            </a:solidFill>
-          </a:ln>
-        </p:spPr>
-        <p:style>
-          <a:lnRef idx="2">
-            <a:schemeClr val="accent1"/>
-          </a:lnRef>
-          <a:fillRef idx="0">
-            <a:schemeClr val="accent1"/>
-          </a:fillRef>
-          <a:effectRef idx="1">
-            <a:schemeClr val="accent1"/>
-          </a:effectRef>
-          <a:fontRef idx="minor">
-            <a:schemeClr val="tx1"/>
-          </a:fontRef>
-        </p:style>
-        <p:txBody>
-          <a:bodyPr rtlCol="0" anchor="ctr"/>
-          <a:lstStyle/>
-          <a:p>
-            <a:pPr algn="ctr"/>
-            <a:endParaRPr lang="en-US">
-              <a:solidFill>
-                <a:srgbClr val="000000"/>
-              </a:solidFill>
-            </a:endParaRPr>
-          </a:p>
-        </p:txBody>
-      </p:sp>
-      <p:sp>
-        <p:nvSpPr>
-          <p:cNvPr id="46" name="Freeform 45"/>
-          <p:cNvSpPr/>
-          <p:nvPr/>
-        </p:nvSpPr>
-        <p:spPr>
           <a:xfrm rot="20810694" flipV="1">
-            <a:off x="2904988" y="3652021"/>
+            <a:off x="2904988" y="3512321"/>
             <a:ext cx="1311639" cy="185568"/>
           </a:xfrm>
           <a:custGeom>
@@ -6614,14 +5793,14 @@
       </p:sp>
       <p:sp>
         <p:nvSpPr>
-          <p:cNvPr id="2" name="TextBox 1"/>
+          <p:cNvPr id="94" name="TextBox 93"/>
           <p:cNvSpPr txBox="1"/>
           <p:nvPr/>
         </p:nvSpPr>
         <p:spPr>
           <a:xfrm>
-            <a:off x="63500" y="3670300"/>
-            <a:ext cx="1168400" cy="461665"/>
+            <a:off x="3556000" y="3721100"/>
+            <a:ext cx="3505200" cy="338554"/>
           </a:xfrm>
           <a:prstGeom prst="rect">
             <a:avLst/>
@@ -6635,23 +5814,25 @@
           <a:lstStyle/>
           <a:p>
             <a:r>
-              <a:rPr lang="en-US" sz="1200" dirty="0" smtClean="0"/>
-              <a:t>extended to ages 85-99</a:t>
-            </a:r>
-            <a:endParaRPr lang="en-US" sz="1200" dirty="0"/>
+              <a:rPr lang="en-US" sz="1600" dirty="0" smtClean="0"/>
+              <a:t>85+ extended to single ages in 85-99</a:t>
+            </a:r>
+            <a:endParaRPr lang="en-US" sz="1600" dirty="0"/>
           </a:p>
         </p:txBody>
       </p:sp>
       <p:cxnSp>
         <p:nvCxnSpPr>
-          <p:cNvPr id="47" name="Straight Arrow Connector 46"/>
-          <p:cNvCxnSpPr/>
+          <p:cNvPr id="95" name="Straight Arrow Connector 94"/>
+          <p:cNvCxnSpPr>
+            <a:stCxn id="94" idx="1"/>
+          </p:cNvCxnSpPr>
           <p:nvPr/>
         </p:nvCxnSpPr>
         <p:spPr>
-          <a:xfrm>
-            <a:off x="876300" y="4013200"/>
-            <a:ext cx="342900" cy="1"/>
+          <a:xfrm flipH="1" flipV="1">
+            <a:off x="3124200" y="3886200"/>
+            <a:ext cx="431800" cy="4177"/>
           </a:xfrm>
           <a:prstGeom prst="straightConnector1">
             <a:avLst/>
@@ -6680,14 +5861,14 @@
       </p:cxnSp>
       <p:sp>
         <p:nvSpPr>
-          <p:cNvPr id="48" name="TextBox 47"/>
+          <p:cNvPr id="96" name="TextBox 95"/>
           <p:cNvSpPr txBox="1"/>
           <p:nvPr/>
         </p:nvSpPr>
         <p:spPr>
           <a:xfrm>
-            <a:off x="50800" y="2616200"/>
-            <a:ext cx="1168400" cy="276999"/>
+            <a:off x="-38100" y="2413000"/>
+            <a:ext cx="1168400" cy="646331"/>
           </a:xfrm>
           <a:prstGeom prst="rect">
             <a:avLst/>
@@ -6701,23 +5882,29 @@
           <a:lstStyle/>
           <a:p>
             <a:r>
-              <a:rPr lang="en-US" sz="1200" dirty="0" smtClean="0"/>
-              <a:t>most used</a:t>
-            </a:r>
-            <a:endParaRPr lang="en-US" sz="1200" dirty="0"/>
+              <a:rPr lang="en-US" dirty="0" smtClean="0"/>
+              <a:t>most </a:t>
+            </a:r>
+          </a:p>
+          <a:p>
+            <a:r>
+              <a:rPr lang="en-US" dirty="0" smtClean="0"/>
+              <a:t>used</a:t>
+            </a:r>
+            <a:endParaRPr lang="en-US" dirty="0"/>
           </a:p>
         </p:txBody>
       </p:sp>
       <p:cxnSp>
         <p:nvCxnSpPr>
-          <p:cNvPr id="49" name="Straight Arrow Connector 48"/>
+          <p:cNvPr id="97" name="Straight Arrow Connector 96"/>
           <p:cNvCxnSpPr/>
           <p:nvPr/>
         </p:nvCxnSpPr>
         <p:spPr>
           <a:xfrm flipV="1">
-            <a:off x="465664" y="1993900"/>
-            <a:ext cx="1515536" cy="699399"/>
+            <a:off x="406400" y="1905000"/>
+            <a:ext cx="698500" cy="622300"/>
           </a:xfrm>
           <a:prstGeom prst="straightConnector1">
             <a:avLst/>
@@ -6746,14 +5933,14 @@
       </p:cxnSp>
       <p:cxnSp>
         <p:nvCxnSpPr>
-          <p:cNvPr id="50" name="Straight Arrow Connector 49"/>
+          <p:cNvPr id="98" name="Straight Arrow Connector 97"/>
           <p:cNvCxnSpPr/>
           <p:nvPr/>
         </p:nvCxnSpPr>
         <p:spPr>
           <a:xfrm>
-            <a:off x="406400" y="2857500"/>
-            <a:ext cx="889000" cy="1117600"/>
+            <a:off x="393700" y="3035300"/>
+            <a:ext cx="571500" cy="812800"/>
           </a:xfrm>
           <a:prstGeom prst="straightConnector1">
             <a:avLst/>

</xml_diff>